<commit_message>
effective dimension added to library
</commit_message>
<xml_diff>
--- a/slides/13. The Power of Quantum Neural Networks.pptx
+++ b/slides/13. The Power of Quantum Neural Networks.pptx
@@ -5,10 +5,10 @@
     <p:sldMasterId id="2147483660" r:id="rId1"/>
   </p:sldMasterIdLst>
   <p:notesMasterIdLst>
-    <p:notesMasterId r:id="rId10"/>
+    <p:notesMasterId r:id="rId13"/>
   </p:notesMasterIdLst>
   <p:handoutMasterIdLst>
-    <p:handoutMasterId r:id="rId11"/>
+    <p:handoutMasterId r:id="rId14"/>
   </p:handoutMasterIdLst>
   <p:sldIdLst>
     <p:sldId id="256" r:id="rId2"/>
@@ -17,8 +17,11 @@
     <p:sldId id="281" r:id="rId5"/>
     <p:sldId id="280" r:id="rId6"/>
     <p:sldId id="282" r:id="rId7"/>
-    <p:sldId id="257" r:id="rId8"/>
-    <p:sldId id="275" r:id="rId9"/>
+    <p:sldId id="283" r:id="rId8"/>
+    <p:sldId id="284" r:id="rId9"/>
+    <p:sldId id="285" r:id="rId10"/>
+    <p:sldId id="257" r:id="rId11"/>
+    <p:sldId id="275" r:id="rId12"/>
   </p:sldIdLst>
   <p:sldSz cx="12192000" cy="6858000"/>
   <p:notesSz cx="6858000" cy="9144000"/>
@@ -227,7 +230,7 @@
           <a:p>
             <a:fld id="{80680FBE-A8DF-4758-9AC4-3A9E1039168F}" type="datetimeFigureOut">
               <a:rPr lang="en-US" smtClean="0"/>
-              <a:t>4/1/2022</a:t>
+              <a:t>4/5/2022</a:t>
             </a:fld>
             <a:endParaRPr lang="en-US" dirty="0"/>
           </a:p>
@@ -392,7 +395,7 @@
           <a:p>
             <a:fld id="{EC13577B-6902-467D-A26C-08A0DD5E4E03}" type="datetimeFigureOut">
               <a:rPr lang="en-US" smtClean="0"/>
-              <a:t>4/1/2022</a:t>
+              <a:t>4/5/2022</a:t>
             </a:fld>
             <a:endParaRPr lang="en-US" dirty="0"/>
           </a:p>
@@ -1187,7 +1190,7 @@
             <a:fld id="{8BEEBAAA-29B5-4AF5-BC5F-7E580C29002D}" type="datetimeFigureOut">
               <a:rPr lang="en-US" smtClean="0"/>
               <a:pPr/>
-              <a:t>4/1/2022</a:t>
+              <a:t>4/5/2022</a:t>
             </a:fld>
             <a:endParaRPr lang="en-US" dirty="0"/>
           </a:p>
@@ -1813,7 +1816,7 @@
             <a:fld id="{8BEEBAAA-29B5-4AF5-BC5F-7E580C29002D}" type="datetimeFigureOut">
               <a:rPr lang="en-US" smtClean="0"/>
               <a:pPr/>
-              <a:t>4/1/2022</a:t>
+              <a:t>4/5/2022</a:t>
             </a:fld>
             <a:endParaRPr lang="en-US" dirty="0"/>
           </a:p>
@@ -2375,6 +2378,585 @@
 </p:sld>
 </file>
 
+<file path=ppt/slides/slide10.xml><?xml version="1.0" encoding="utf-8"?>
+<p:sld xmlns:a="http://schemas.openxmlformats.org/drawingml/2006/main" xmlns:r="http://schemas.openxmlformats.org/officeDocument/2006/relationships" xmlns:p="http://schemas.openxmlformats.org/presentationml/2006/main">
+  <p:cSld>
+    <p:spTree>
+      <p:nvGrpSpPr>
+        <p:cNvPr id="1" name=""/>
+        <p:cNvGrpSpPr/>
+        <p:nvPr/>
+      </p:nvGrpSpPr>
+      <p:grpSpPr>
+        <a:xfrm>
+          <a:off x="0" y="0"/>
+          <a:ext cx="0" cy="0"/>
+          <a:chOff x="0" y="0"/>
+          <a:chExt cx="0" cy="0"/>
+        </a:xfrm>
+      </p:grpSpPr>
+      <p:sp>
+        <p:nvSpPr>
+          <p:cNvPr id="2" name="Title 1"/>
+          <p:cNvSpPr>
+            <a:spLocks noGrp="1"/>
+          </p:cNvSpPr>
+          <p:nvPr>
+            <p:ph type="title"/>
+          </p:nvPr>
+        </p:nvSpPr>
+        <p:spPr/>
+        <p:txBody>
+          <a:bodyPr>
+            <a:normAutofit/>
+          </a:bodyPr>
+          <a:lstStyle/>
+          <a:p>
+            <a:pPr lvl="0"/>
+            <a:r>
+              <a:rPr lang="en-US" dirty="0">
+                <a:latin typeface="Segoe UI Light" panose="020B0502040204020203" pitchFamily="34" charset="0"/>
+                <a:cs typeface="Segoe UI Light" panose="020B0502040204020203" pitchFamily="34" charset="0"/>
+              </a:rPr>
+              <a:t>Reference</a:t>
+            </a:r>
+          </a:p>
+        </p:txBody>
+      </p:sp>
+      <p:sp>
+        <p:nvSpPr>
+          <p:cNvPr id="5" name="Content Placeholder 4"/>
+          <p:cNvSpPr>
+            <a:spLocks noGrp="1"/>
+          </p:cNvSpPr>
+          <p:nvPr>
+            <p:ph sz="half" idx="4294967295"/>
+          </p:nvPr>
+        </p:nvSpPr>
+        <p:spPr>
+          <a:xfrm>
+            <a:off x="541611" y="1431011"/>
+            <a:ext cx="6531542" cy="1841108"/>
+          </a:xfrm>
+        </p:spPr>
+        <p:txBody>
+          <a:bodyPr vert="horz" lIns="91440" tIns="45720" rIns="91440" bIns="45720" rtlCol="0">
+            <a:normAutofit/>
+          </a:bodyPr>
+          <a:lstStyle/>
+          <a:p>
+            <a:pPr marL="0" indent="0" algn="just">
+              <a:lnSpc>
+                <a:spcPts val="1800"/>
+              </a:lnSpc>
+              <a:spcBef>
+                <a:spcPts val="1000"/>
+              </a:spcBef>
+              <a:spcAft>
+                <a:spcPts val="2000"/>
+              </a:spcAft>
+              <a:buNone/>
+            </a:pPr>
+            <a:r>
+              <a:rPr lang="en-US" sz="1200" dirty="0">
+                <a:solidFill>
+                  <a:prstClr val="black">
+                    <a:lumMod val="75000"/>
+                    <a:lumOff val="25000"/>
+                  </a:prstClr>
+                </a:solidFill>
+                <a:latin typeface="Segoe UI" panose="020B0502040204020203" pitchFamily="34" charset="0"/>
+                <a:cs typeface="Segoe UI" panose="020B0502040204020203" pitchFamily="34" charset="0"/>
+              </a:rPr>
+              <a:t>[1] </a:t>
+            </a:r>
+            <a:r>
+              <a:rPr lang="en-US" b="0" i="0" dirty="0">
+                <a:solidFill>
+                  <a:srgbClr val="222222"/>
+                </a:solidFill>
+                <a:effectLst/>
+                <a:latin typeface="-apple-system"/>
+              </a:rPr>
+              <a:t>Abbas, A., Sutter, D., </a:t>
+            </a:r>
+            <a:r>
+              <a:rPr lang="en-US" b="0" i="0" dirty="0" err="1">
+                <a:solidFill>
+                  <a:srgbClr val="222222"/>
+                </a:solidFill>
+                <a:effectLst/>
+                <a:latin typeface="-apple-system"/>
+              </a:rPr>
+              <a:t>Zoufal</a:t>
+            </a:r>
+            <a:r>
+              <a:rPr lang="en-US" b="0" i="0" dirty="0">
+                <a:solidFill>
+                  <a:srgbClr val="222222"/>
+                </a:solidFill>
+                <a:effectLst/>
+                <a:latin typeface="-apple-system"/>
+              </a:rPr>
+              <a:t>, C. </a:t>
+            </a:r>
+            <a:r>
+              <a:rPr lang="en-US" b="0" i="1" dirty="0">
+                <a:solidFill>
+                  <a:srgbClr val="222222"/>
+                </a:solidFill>
+                <a:effectLst/>
+                <a:latin typeface="-apple-system"/>
+              </a:rPr>
+              <a:t>et al.</a:t>
+            </a:r>
+            <a:r>
+              <a:rPr lang="en-US" b="0" i="0" dirty="0">
+                <a:solidFill>
+                  <a:srgbClr val="222222"/>
+                </a:solidFill>
+                <a:effectLst/>
+                <a:latin typeface="-apple-system"/>
+              </a:rPr>
+              <a:t> The power of quantum neural networks. </a:t>
+            </a:r>
+            <a:r>
+              <a:rPr lang="en-US" b="0" i="1" dirty="0">
+                <a:solidFill>
+                  <a:srgbClr val="222222"/>
+                </a:solidFill>
+                <a:effectLst/>
+                <a:latin typeface="-apple-system"/>
+              </a:rPr>
+              <a:t>Nat </a:t>
+            </a:r>
+            <a:r>
+              <a:rPr lang="en-US" b="0" i="1" dirty="0" err="1">
+                <a:solidFill>
+                  <a:srgbClr val="222222"/>
+                </a:solidFill>
+                <a:effectLst/>
+                <a:latin typeface="-apple-system"/>
+              </a:rPr>
+              <a:t>Comput</a:t>
+            </a:r>
+            <a:r>
+              <a:rPr lang="en-US" b="0" i="1" dirty="0">
+                <a:solidFill>
+                  <a:srgbClr val="222222"/>
+                </a:solidFill>
+                <a:effectLst/>
+                <a:latin typeface="-apple-system"/>
+              </a:rPr>
+              <a:t> Sci</a:t>
+            </a:r>
+            <a:r>
+              <a:rPr lang="en-US" b="0" i="0" dirty="0">
+                <a:solidFill>
+                  <a:srgbClr val="222222"/>
+                </a:solidFill>
+                <a:effectLst/>
+                <a:latin typeface="-apple-system"/>
+              </a:rPr>
+              <a:t> </a:t>
+            </a:r>
+            <a:r>
+              <a:rPr lang="en-US" b="1" i="0" dirty="0">
+                <a:solidFill>
+                  <a:srgbClr val="222222"/>
+                </a:solidFill>
+                <a:effectLst/>
+                <a:latin typeface="-apple-system"/>
+              </a:rPr>
+              <a:t>1, </a:t>
+            </a:r>
+            <a:r>
+              <a:rPr lang="en-US" b="0" i="0" dirty="0">
+                <a:solidFill>
+                  <a:srgbClr val="222222"/>
+                </a:solidFill>
+                <a:effectLst/>
+                <a:latin typeface="-apple-system"/>
+              </a:rPr>
+              <a:t>403–409 (2021). https://doi.org/10.1038/s43588-021-00084-1</a:t>
+            </a:r>
+            <a:endParaRPr lang="en-US" sz="1200" dirty="0">
+              <a:solidFill>
+                <a:prstClr val="black">
+                  <a:lumMod val="75000"/>
+                  <a:lumOff val="25000"/>
+                </a:prstClr>
+              </a:solidFill>
+              <a:latin typeface="Segoe UI" panose="020B0502040204020203" pitchFamily="34" charset="0"/>
+              <a:cs typeface="Segoe UI" panose="020B0502040204020203" pitchFamily="34" charset="0"/>
+            </a:endParaRPr>
+          </a:p>
+        </p:txBody>
+      </p:sp>
+    </p:spTree>
+    <p:extLst>
+      <p:ext uri="{BB962C8B-B14F-4D97-AF65-F5344CB8AC3E}">
+        <p14:creationId xmlns:p14="http://schemas.microsoft.com/office/powerpoint/2010/main" val="1328676004"/>
+      </p:ext>
+    </p:extLst>
+  </p:cSld>
+  <p:clrMapOvr>
+    <a:masterClrMapping/>
+  </p:clrMapOvr>
+  <mc:AlternateContent xmlns:mc="http://schemas.openxmlformats.org/markup-compatibility/2006" xmlns:p14="http://schemas.microsoft.com/office/powerpoint/2010/main">
+    <mc:Choice Requires="p14">
+      <p:transition p14:dur="10"/>
+    </mc:Choice>
+    <mc:Fallback xmlns="">
+      <p:transition/>
+    </mc:Fallback>
+  </mc:AlternateContent>
+</p:sld>
+</file>
+
+<file path=ppt/slides/slide11.xml><?xml version="1.0" encoding="utf-8"?>
+<p:sld xmlns:a="http://schemas.openxmlformats.org/drawingml/2006/main" xmlns:r="http://schemas.openxmlformats.org/officeDocument/2006/relationships" xmlns:p="http://schemas.openxmlformats.org/presentationml/2006/main">
+  <p:cSld>
+    <p:spTree>
+      <p:nvGrpSpPr>
+        <p:cNvPr id="1" name=""/>
+        <p:cNvGrpSpPr/>
+        <p:nvPr/>
+      </p:nvGrpSpPr>
+      <p:grpSpPr>
+        <a:xfrm>
+          <a:off x="0" y="0"/>
+          <a:ext cx="0" cy="0"/>
+          <a:chOff x="0" y="0"/>
+          <a:chExt cx="0" cy="0"/>
+        </a:xfrm>
+      </p:grpSpPr>
+      <p:sp>
+        <p:nvSpPr>
+          <p:cNvPr id="6" name="Title 5"/>
+          <p:cNvSpPr>
+            <a:spLocks noGrp="1"/>
+          </p:cNvSpPr>
+          <p:nvPr>
+            <p:ph type="title"/>
+          </p:nvPr>
+        </p:nvSpPr>
+        <p:spPr/>
+        <p:txBody>
+          <a:bodyPr/>
+          <a:lstStyle/>
+          <a:p>
+            <a:r>
+              <a:rPr lang="en-US" dirty="0">
+                <a:latin typeface="Segoe UI Light" panose="020B0502040204020203" pitchFamily="34" charset="0"/>
+                <a:cs typeface="Segoe UI Light" panose="020B0502040204020203" pitchFamily="34" charset="0"/>
+              </a:rPr>
+              <a:t>Progress</a:t>
+            </a:r>
+          </a:p>
+        </p:txBody>
+      </p:sp>
+      <p:sp>
+        <p:nvSpPr>
+          <p:cNvPr id="38" name="Content Placeholder 17"/>
+          <p:cNvSpPr txBox="1">
+            <a:spLocks/>
+          </p:cNvSpPr>
+          <p:nvPr/>
+        </p:nvSpPr>
+        <p:spPr>
+          <a:xfrm>
+            <a:off x="604362" y="1511253"/>
+            <a:ext cx="9059591" cy="2209100"/>
+          </a:xfrm>
+          <a:prstGeom prst="rect">
+            <a:avLst/>
+          </a:prstGeom>
+        </p:spPr>
+        <p:txBody>
+          <a:bodyPr vert="horz" lIns="91440" tIns="45720" rIns="91440" bIns="45720" rtlCol="0">
+            <a:normAutofit/>
+          </a:bodyPr>
+          <a:lstStyle>
+            <a:lvl1pPr marL="228600" indent="-228600" algn="l" defTabSz="914400" rtl="0" eaLnBrk="1" latinLnBrk="0" hangingPunct="1">
+              <a:lnSpc>
+                <a:spcPts val="1800"/>
+              </a:lnSpc>
+              <a:spcBef>
+                <a:spcPts val="1000"/>
+              </a:spcBef>
+              <a:spcAft>
+                <a:spcPts val="1000"/>
+              </a:spcAft>
+              <a:buFont typeface="Arial" panose="020B0604020202020204" pitchFamily="34" charset="0"/>
+              <a:buChar char="•"/>
+              <a:defRPr lang="en-US" sz="1200" kern="1200" smtClean="0">
+                <a:solidFill>
+                  <a:schemeClr val="tx1">
+                    <a:lumMod val="75000"/>
+                    <a:lumOff val="25000"/>
+                  </a:schemeClr>
+                </a:solidFill>
+                <a:latin typeface="+mn-lt"/>
+                <a:ea typeface="+mn-ea"/>
+                <a:cs typeface="+mn-cs"/>
+              </a:defRPr>
+            </a:lvl1pPr>
+            <a:lvl2pPr marL="685800" indent="-228600" algn="l" defTabSz="914400" rtl="0" eaLnBrk="1" latinLnBrk="0" hangingPunct="1">
+              <a:lnSpc>
+                <a:spcPts val="1800"/>
+              </a:lnSpc>
+              <a:spcBef>
+                <a:spcPts val="1000"/>
+              </a:spcBef>
+              <a:spcAft>
+                <a:spcPts val="1000"/>
+              </a:spcAft>
+              <a:buFont typeface="Arial" panose="020B0604020202020204" pitchFamily="34" charset="0"/>
+              <a:buChar char="•"/>
+              <a:defRPr lang="en-US" sz="1200" kern="1200" smtClean="0">
+                <a:solidFill>
+                  <a:schemeClr val="tx1">
+                    <a:lumMod val="75000"/>
+                    <a:lumOff val="25000"/>
+                  </a:schemeClr>
+                </a:solidFill>
+                <a:latin typeface="+mn-lt"/>
+                <a:ea typeface="+mn-ea"/>
+                <a:cs typeface="+mn-cs"/>
+              </a:defRPr>
+            </a:lvl2pPr>
+            <a:lvl3pPr marL="1143000" indent="-228600" algn="l" defTabSz="914400" rtl="0" eaLnBrk="1" latinLnBrk="0" hangingPunct="1">
+              <a:lnSpc>
+                <a:spcPts val="1800"/>
+              </a:lnSpc>
+              <a:spcBef>
+                <a:spcPts val="1000"/>
+              </a:spcBef>
+              <a:spcAft>
+                <a:spcPts val="1000"/>
+              </a:spcAft>
+              <a:buFont typeface="Arial" panose="020B0604020202020204" pitchFamily="34" charset="0"/>
+              <a:buChar char="•"/>
+              <a:defRPr lang="en-US" sz="1200" kern="1200" smtClean="0">
+                <a:solidFill>
+                  <a:schemeClr val="tx1">
+                    <a:lumMod val="75000"/>
+                    <a:lumOff val="25000"/>
+                  </a:schemeClr>
+                </a:solidFill>
+                <a:latin typeface="+mn-lt"/>
+                <a:ea typeface="+mn-ea"/>
+                <a:cs typeface="+mn-cs"/>
+              </a:defRPr>
+            </a:lvl3pPr>
+            <a:lvl4pPr marL="1600200" indent="-228600" algn="l" defTabSz="914400" rtl="0" eaLnBrk="1" latinLnBrk="0" hangingPunct="1">
+              <a:lnSpc>
+                <a:spcPts val="1800"/>
+              </a:lnSpc>
+              <a:spcBef>
+                <a:spcPts val="1000"/>
+              </a:spcBef>
+              <a:spcAft>
+                <a:spcPts val="1000"/>
+              </a:spcAft>
+              <a:buFont typeface="Arial" panose="020B0604020202020204" pitchFamily="34" charset="0"/>
+              <a:buChar char="•"/>
+              <a:defRPr lang="en-US" sz="1200" kern="1200" smtClean="0">
+                <a:solidFill>
+                  <a:schemeClr val="tx1">
+                    <a:lumMod val="75000"/>
+                    <a:lumOff val="25000"/>
+                  </a:schemeClr>
+                </a:solidFill>
+                <a:latin typeface="+mn-lt"/>
+                <a:ea typeface="+mn-ea"/>
+                <a:cs typeface="+mn-cs"/>
+              </a:defRPr>
+            </a:lvl4pPr>
+            <a:lvl5pPr marL="2057400" indent="-228600" algn="l" defTabSz="914400" rtl="0" eaLnBrk="1" latinLnBrk="0" hangingPunct="1">
+              <a:lnSpc>
+                <a:spcPts val="1800"/>
+              </a:lnSpc>
+              <a:spcBef>
+                <a:spcPts val="1000"/>
+              </a:spcBef>
+              <a:spcAft>
+                <a:spcPts val="1000"/>
+              </a:spcAft>
+              <a:buFont typeface="Arial" panose="020B0604020202020204" pitchFamily="34" charset="0"/>
+              <a:buChar char="•"/>
+              <a:defRPr lang="en-US" sz="1200" kern="1200">
+                <a:solidFill>
+                  <a:schemeClr val="tx1">
+                    <a:lumMod val="75000"/>
+                    <a:lumOff val="25000"/>
+                  </a:schemeClr>
+                </a:solidFill>
+                <a:latin typeface="+mn-lt"/>
+                <a:ea typeface="+mn-ea"/>
+                <a:cs typeface="+mn-cs"/>
+              </a:defRPr>
+            </a:lvl5pPr>
+            <a:lvl6pPr marL="2514600" indent="-228600" algn="l" defTabSz="914400" rtl="0" eaLnBrk="1" latinLnBrk="0" hangingPunct="1">
+              <a:lnSpc>
+                <a:spcPct val="90000"/>
+              </a:lnSpc>
+              <a:spcBef>
+                <a:spcPct val="30000"/>
+              </a:spcBef>
+              <a:buFont typeface="Arial" panose="020B0604020202020204" pitchFamily="34" charset="0"/>
+              <a:buChar char="•"/>
+              <a:defRPr sz="1800" kern="1200">
+                <a:solidFill>
+                  <a:schemeClr val="tx1"/>
+                </a:solidFill>
+                <a:latin typeface="+mn-lt"/>
+                <a:ea typeface="+mn-ea"/>
+                <a:cs typeface="+mn-cs"/>
+              </a:defRPr>
+            </a:lvl6pPr>
+            <a:lvl7pPr marL="2971800" indent="-228600" algn="l" defTabSz="914400" rtl="0" eaLnBrk="1" latinLnBrk="0" hangingPunct="1">
+              <a:lnSpc>
+                <a:spcPct val="90000"/>
+              </a:lnSpc>
+              <a:spcBef>
+                <a:spcPct val="30000"/>
+              </a:spcBef>
+              <a:buFont typeface="Arial" panose="020B0604020202020204" pitchFamily="34" charset="0"/>
+              <a:buChar char="•"/>
+              <a:defRPr sz="1800" kern="1200">
+                <a:solidFill>
+                  <a:schemeClr val="tx1"/>
+                </a:solidFill>
+                <a:latin typeface="+mn-lt"/>
+                <a:ea typeface="+mn-ea"/>
+                <a:cs typeface="+mn-cs"/>
+              </a:defRPr>
+            </a:lvl7pPr>
+            <a:lvl8pPr marL="3429000" indent="-228600" algn="l" defTabSz="914400" rtl="0" eaLnBrk="1" latinLnBrk="0" hangingPunct="1">
+              <a:lnSpc>
+                <a:spcPct val="90000"/>
+              </a:lnSpc>
+              <a:spcBef>
+                <a:spcPct val="30000"/>
+              </a:spcBef>
+              <a:buFont typeface="Arial" panose="020B0604020202020204" pitchFamily="34" charset="0"/>
+              <a:buChar char="•"/>
+              <a:defRPr sz="1800" kern="1200">
+                <a:solidFill>
+                  <a:schemeClr val="tx1"/>
+                </a:solidFill>
+                <a:latin typeface="+mn-lt"/>
+                <a:ea typeface="+mn-ea"/>
+                <a:cs typeface="+mn-cs"/>
+              </a:defRPr>
+            </a:lvl8pPr>
+            <a:lvl9pPr marL="3886200" indent="-228600" algn="l" defTabSz="914400" rtl="0" eaLnBrk="1" latinLnBrk="0" hangingPunct="1">
+              <a:lnSpc>
+                <a:spcPct val="90000"/>
+              </a:lnSpc>
+              <a:spcBef>
+                <a:spcPct val="30000"/>
+              </a:spcBef>
+              <a:buFont typeface="Arial" panose="020B0604020202020204" pitchFamily="34" charset="0"/>
+              <a:buChar char="•"/>
+              <a:defRPr sz="1800" kern="1200">
+                <a:solidFill>
+                  <a:schemeClr val="tx1"/>
+                </a:solidFill>
+                <a:latin typeface="+mn-lt"/>
+                <a:ea typeface="+mn-ea"/>
+                <a:cs typeface="+mn-cs"/>
+              </a:defRPr>
+            </a:lvl9pPr>
+          </a:lstStyle>
+          <a:p>
+            <a:pPr marL="0" indent="0">
+              <a:spcAft>
+                <a:spcPts val="2000"/>
+              </a:spcAft>
+              <a:buNone/>
+            </a:pPr>
+            <a:r>
+              <a:rPr lang="en-US" dirty="0">
+                <a:solidFill>
+                  <a:prstClr val="black">
+                    <a:lumMod val="75000"/>
+                    <a:lumOff val="25000"/>
+                  </a:prstClr>
+                </a:solidFill>
+                <a:latin typeface="Segoe UI" panose="020B0502040204020203" pitchFamily="34" charset="0"/>
+                <a:cs typeface="Segoe UI" panose="020B0502040204020203" pitchFamily="34" charset="0"/>
+              </a:rPr>
+              <a:t>While I am looking into various references for measuring quantum volume for quantum neural networks, Effective dimension is a very good measure in quantifying the effectiveness of the quantum models. On the next steps,</a:t>
+            </a:r>
+          </a:p>
+          <a:p>
+            <a:pPr>
+              <a:spcAft>
+                <a:spcPts val="2000"/>
+              </a:spcAft>
+              <a:buAutoNum type="arabicPeriod"/>
+            </a:pPr>
+            <a:r>
+              <a:rPr lang="en-US" dirty="0">
+                <a:solidFill>
+                  <a:prstClr val="black">
+                    <a:lumMod val="75000"/>
+                    <a:lumOff val="25000"/>
+                  </a:prstClr>
+                </a:solidFill>
+                <a:latin typeface="Segoe UI" panose="020B0502040204020203" pitchFamily="34" charset="0"/>
+                <a:cs typeface="Segoe UI" panose="020B0502040204020203" pitchFamily="34" charset="0"/>
+              </a:rPr>
+              <a:t>I will be working on coding the effective dimension measure</a:t>
+            </a:r>
+          </a:p>
+          <a:p>
+            <a:pPr>
+              <a:spcAft>
+                <a:spcPts val="2000"/>
+              </a:spcAft>
+              <a:buAutoNum type="arabicPeriod"/>
+            </a:pPr>
+            <a:r>
+              <a:rPr lang="en-US" dirty="0">
+                <a:solidFill>
+                  <a:prstClr val="black">
+                    <a:lumMod val="75000"/>
+                    <a:lumOff val="25000"/>
+                  </a:prstClr>
+                </a:solidFill>
+                <a:latin typeface="Segoe UI" panose="020B0502040204020203" pitchFamily="34" charset="0"/>
+                <a:cs typeface="Segoe UI" panose="020B0502040204020203" pitchFamily="34" charset="0"/>
+              </a:rPr>
+              <a:t>I am learning more on Error Mitigation as well.</a:t>
+            </a:r>
+          </a:p>
+        </p:txBody>
+      </p:sp>
+    </p:spTree>
+    <p:extLst>
+      <p:ext uri="{BB962C8B-B14F-4D97-AF65-F5344CB8AC3E}">
+        <p14:creationId xmlns:p14="http://schemas.microsoft.com/office/powerpoint/2010/main" val="727668169"/>
+      </p:ext>
+    </p:extLst>
+  </p:cSld>
+  <p:clrMapOvr>
+    <a:masterClrMapping/>
+  </p:clrMapOvr>
+  <mc:AlternateContent xmlns:mc="http://schemas.openxmlformats.org/markup-compatibility/2006" xmlns:p14="http://schemas.microsoft.com/office/powerpoint/2010/main">
+    <mc:Choice Requires="p14">
+      <p:transition p14:dur="10"/>
+    </mc:Choice>
+    <mc:Fallback xmlns="">
+      <p:transition/>
+    </mc:Fallback>
+  </mc:AlternateContent>
+</p:sld>
+</file>
+
 <file path=ppt/slides/slide2.xml><?xml version="1.0" encoding="utf-8"?>
 <p:sld xmlns:a="http://schemas.openxmlformats.org/drawingml/2006/main" xmlns:r="http://schemas.openxmlformats.org/officeDocument/2006/relationships" xmlns:p="http://schemas.openxmlformats.org/presentationml/2006/main">
   <p:cSld>
@@ -3484,7 +4066,13 @@
       </p:grpSpPr>
       <p:sp>
         <p:nvSpPr>
-          <p:cNvPr id="2" name="Title 1"/>
+          <p:cNvPr id="2" name="Title 1">
+            <a:extLst>
+              <a:ext uri="{FF2B5EF4-FFF2-40B4-BE49-F238E27FC236}">
+                <a16:creationId xmlns:a16="http://schemas.microsoft.com/office/drawing/2014/main" id="{6D4CF992-0EAC-492D-947C-001DBFC8DBCE}"/>
+              </a:ext>
+            </a:extLst>
+          </p:cNvPr>
           <p:cNvSpPr>
             <a:spLocks noGrp="1"/>
           </p:cNvSpPr>
@@ -3494,210 +4082,166 @@
         </p:nvSpPr>
         <p:spPr/>
         <p:txBody>
+          <a:bodyPr/>
+          <a:lstStyle/>
+          <a:p>
+            <a:r>
+              <a:rPr lang="en-US" dirty="0"/>
+              <a:t>Example CNN and QNN</a:t>
+            </a:r>
+          </a:p>
+        </p:txBody>
+      </p:sp>
+      <p:sp>
+        <p:nvSpPr>
+          <p:cNvPr id="7" name="Content Placeholder 6">
+            <a:extLst>
+              <a:ext uri="{FF2B5EF4-FFF2-40B4-BE49-F238E27FC236}">
+                <a16:creationId xmlns:a16="http://schemas.microsoft.com/office/drawing/2014/main" id="{209DEC08-ED21-4828-986A-2FF603B8D7D2}"/>
+              </a:ext>
+            </a:extLst>
+          </p:cNvPr>
+          <p:cNvSpPr>
+            <a:spLocks noGrp="1"/>
+          </p:cNvSpPr>
+          <p:nvPr>
+            <p:ph sz="quarter" idx="10"/>
+          </p:nvPr>
+        </p:nvSpPr>
+        <p:spPr>
+          <a:xfrm>
+            <a:off x="629143" y="1501853"/>
+            <a:ext cx="5099304" cy="640080"/>
+          </a:xfrm>
+        </p:spPr>
+        <p:txBody>
           <a:bodyPr>
             <a:normAutofit/>
           </a:bodyPr>
           <a:lstStyle/>
           <a:p>
-            <a:pPr lvl="0"/>
-            <a:r>
-              <a:rPr lang="en-US" dirty="0">
-                <a:latin typeface="Segoe UI Light" panose="020B0502040204020203" pitchFamily="34" charset="0"/>
-                <a:cs typeface="Segoe UI Light" panose="020B0502040204020203" pitchFamily="34" charset="0"/>
-              </a:rPr>
-              <a:t>Reference</a:t>
-            </a:r>
-          </a:p>
-        </p:txBody>
-      </p:sp>
-      <p:sp>
-        <p:nvSpPr>
-          <p:cNvPr id="5" name="Content Placeholder 4"/>
-          <p:cNvSpPr>
-            <a:spLocks noGrp="1"/>
-          </p:cNvSpPr>
-          <p:nvPr>
-            <p:ph sz="half" idx="4294967295"/>
-          </p:nvPr>
-        </p:nvSpPr>
-        <p:spPr>
-          <a:xfrm>
-            <a:off x="541611" y="1431011"/>
-            <a:ext cx="6531542" cy="1841108"/>
-          </a:xfrm>
-        </p:spPr>
-        <p:txBody>
-          <a:bodyPr vert="horz" lIns="91440" tIns="45720" rIns="91440" bIns="45720" rtlCol="0">
-            <a:normAutofit/>
+            <a:r>
+              <a:rPr lang="en-US" sz="1600" b="1" i="1" dirty="0">
+                <a:solidFill>
+                  <a:srgbClr val="FF0000"/>
+                </a:solidFill>
+                <a:latin typeface="+mj-lt"/>
+              </a:rPr>
+              <a:t>Modelling CNN</a:t>
+            </a:r>
+          </a:p>
+        </p:txBody>
+      </p:sp>
+      <p:pic>
+        <p:nvPicPr>
+          <p:cNvPr id="9" name="Picture 8">
+            <a:extLst>
+              <a:ext uri="{FF2B5EF4-FFF2-40B4-BE49-F238E27FC236}">
+                <a16:creationId xmlns:a16="http://schemas.microsoft.com/office/drawing/2014/main" id="{9C770625-C639-4A71-B1D1-B1DB0C573972}"/>
+              </a:ext>
+            </a:extLst>
+          </p:cNvPr>
+          <p:cNvPicPr>
+            <a:picLocks noChangeAspect="1"/>
+          </p:cNvPicPr>
+          <p:nvPr/>
+        </p:nvPicPr>
+        <p:blipFill>
+          <a:blip r:embed="rId2"/>
+          <a:stretch>
+            <a:fillRect/>
+          </a:stretch>
+        </p:blipFill>
+        <p:spPr>
+          <a:xfrm>
+            <a:off x="629143" y="2201194"/>
+            <a:ext cx="5404103" cy="3154953"/>
+          </a:xfrm>
+          <a:prstGeom prst="rect">
+            <a:avLst/>
+          </a:prstGeom>
+        </p:spPr>
+      </p:pic>
+      <p:sp>
+        <p:nvSpPr>
+          <p:cNvPr id="10" name="TextBox 9">
+            <a:extLst>
+              <a:ext uri="{FF2B5EF4-FFF2-40B4-BE49-F238E27FC236}">
+                <a16:creationId xmlns:a16="http://schemas.microsoft.com/office/drawing/2014/main" id="{9EE0B9F6-96C4-44E2-BC58-55AFA259FCCD}"/>
+              </a:ext>
+            </a:extLst>
+          </p:cNvPr>
+          <p:cNvSpPr txBox="1"/>
+          <p:nvPr/>
+        </p:nvSpPr>
+        <p:spPr>
+          <a:xfrm>
+            <a:off x="8130988" y="1637227"/>
+            <a:ext cx="1516762" cy="338554"/>
+          </a:xfrm>
+          <a:prstGeom prst="rect">
+            <a:avLst/>
+          </a:prstGeom>
+          <a:noFill/>
+        </p:spPr>
+        <p:txBody>
+          <a:bodyPr wrap="none" rtlCol="0">
+            <a:spAutoFit/>
           </a:bodyPr>
           <a:lstStyle/>
           <a:p>
-            <a:pPr marL="0" indent="0" algn="just">
-              <a:lnSpc>
-                <a:spcPts val="1800"/>
-              </a:lnSpc>
-              <a:spcBef>
-                <a:spcPts val="1000"/>
-              </a:spcBef>
-              <a:spcAft>
-                <a:spcPts val="2000"/>
-              </a:spcAft>
-              <a:buNone/>
-            </a:pPr>
-            <a:r>
-              <a:rPr lang="en-US" sz="1200" dirty="0">
-                <a:solidFill>
-                  <a:prstClr val="black">
-                    <a:lumMod val="75000"/>
-                    <a:lumOff val="25000"/>
-                  </a:prstClr>
-                </a:solidFill>
-                <a:latin typeface="Segoe UI" panose="020B0502040204020203" pitchFamily="34" charset="0"/>
-                <a:cs typeface="Segoe UI" panose="020B0502040204020203" pitchFamily="34" charset="0"/>
-              </a:rPr>
-              <a:t>[1] </a:t>
-            </a:r>
-            <a:r>
-              <a:rPr lang="en-US" b="0" i="0" dirty="0">
-                <a:solidFill>
-                  <a:srgbClr val="222222"/>
-                </a:solidFill>
-                <a:effectLst/>
-                <a:latin typeface="-apple-system"/>
-              </a:rPr>
-              <a:t>Abbas, A., Sutter, D., </a:t>
-            </a:r>
-            <a:r>
-              <a:rPr lang="en-US" b="0" i="0" dirty="0" err="1">
-                <a:solidFill>
-                  <a:srgbClr val="222222"/>
-                </a:solidFill>
-                <a:effectLst/>
-                <a:latin typeface="-apple-system"/>
-              </a:rPr>
-              <a:t>Zoufal</a:t>
-            </a:r>
-            <a:r>
-              <a:rPr lang="en-US" b="0" i="0" dirty="0">
-                <a:solidFill>
-                  <a:srgbClr val="222222"/>
-                </a:solidFill>
-                <a:effectLst/>
-                <a:latin typeface="-apple-system"/>
-              </a:rPr>
-              <a:t>, C. </a:t>
-            </a:r>
-            <a:r>
-              <a:rPr lang="en-US" b="0" i="1" dirty="0">
-                <a:solidFill>
-                  <a:srgbClr val="222222"/>
-                </a:solidFill>
-                <a:effectLst/>
-                <a:latin typeface="-apple-system"/>
-              </a:rPr>
-              <a:t>et al.</a:t>
-            </a:r>
-            <a:r>
-              <a:rPr lang="en-US" b="0" i="0" dirty="0">
-                <a:solidFill>
-                  <a:srgbClr val="222222"/>
-                </a:solidFill>
-                <a:effectLst/>
-                <a:latin typeface="-apple-system"/>
-              </a:rPr>
-              <a:t> The power of quantum neural networks. </a:t>
-            </a:r>
-            <a:r>
-              <a:rPr lang="en-US" b="0" i="1" dirty="0">
-                <a:solidFill>
-                  <a:srgbClr val="222222"/>
-                </a:solidFill>
-                <a:effectLst/>
-                <a:latin typeface="-apple-system"/>
-              </a:rPr>
-              <a:t>Nat </a:t>
-            </a:r>
-            <a:r>
-              <a:rPr lang="en-US" b="0" i="1" dirty="0" err="1">
-                <a:solidFill>
-                  <a:srgbClr val="222222"/>
-                </a:solidFill>
-                <a:effectLst/>
-                <a:latin typeface="-apple-system"/>
-              </a:rPr>
-              <a:t>Comput</a:t>
-            </a:r>
-            <a:r>
-              <a:rPr lang="en-US" b="0" i="1" dirty="0">
-                <a:solidFill>
-                  <a:srgbClr val="222222"/>
-                </a:solidFill>
-                <a:effectLst/>
-                <a:latin typeface="-apple-system"/>
-              </a:rPr>
-              <a:t> Sci</a:t>
-            </a:r>
-            <a:r>
-              <a:rPr lang="en-US" b="0" i="0" dirty="0">
-                <a:solidFill>
-                  <a:srgbClr val="222222"/>
-                </a:solidFill>
-                <a:effectLst/>
-                <a:latin typeface="-apple-system"/>
-              </a:rPr>
-              <a:t> </a:t>
-            </a:r>
-            <a:r>
-              <a:rPr lang="en-US" b="1" i="0" dirty="0">
-                <a:solidFill>
-                  <a:srgbClr val="222222"/>
-                </a:solidFill>
-                <a:effectLst/>
-                <a:latin typeface="-apple-system"/>
-              </a:rPr>
-              <a:t>1, </a:t>
-            </a:r>
-            <a:r>
-              <a:rPr lang="en-US" b="0" i="0" dirty="0">
-                <a:solidFill>
-                  <a:srgbClr val="222222"/>
-                </a:solidFill>
-                <a:effectLst/>
-                <a:latin typeface="-apple-system"/>
-              </a:rPr>
-              <a:t>403–409 (2021). https://doi.org/10.1038/s43588-021-00084-1</a:t>
-            </a:r>
-            <a:endParaRPr lang="en-US" sz="1200" dirty="0">
-              <a:solidFill>
-                <a:prstClr val="black">
-                  <a:lumMod val="75000"/>
-                  <a:lumOff val="25000"/>
-                </a:prstClr>
-              </a:solidFill>
-              <a:latin typeface="Segoe UI" panose="020B0502040204020203" pitchFamily="34" charset="0"/>
-              <a:cs typeface="Segoe UI" panose="020B0502040204020203" pitchFamily="34" charset="0"/>
-            </a:endParaRPr>
-          </a:p>
-        </p:txBody>
-      </p:sp>
+            <a:r>
+              <a:rPr lang="en-US" sz="1600" b="1" i="1" dirty="0">
+                <a:solidFill>
+                  <a:srgbClr val="FF0000"/>
+                </a:solidFill>
+                <a:latin typeface="+mj-lt"/>
+              </a:rPr>
+              <a:t>Modelling QNN</a:t>
+            </a:r>
+          </a:p>
+        </p:txBody>
+      </p:sp>
+      <p:pic>
+        <p:nvPicPr>
+          <p:cNvPr id="12" name="Picture 11">
+            <a:extLst>
+              <a:ext uri="{FF2B5EF4-FFF2-40B4-BE49-F238E27FC236}">
+                <a16:creationId xmlns:a16="http://schemas.microsoft.com/office/drawing/2014/main" id="{A016020F-12DF-45AE-9208-D5EA8057D138}"/>
+              </a:ext>
+            </a:extLst>
+          </p:cNvPr>
+          <p:cNvPicPr>
+            <a:picLocks noChangeAspect="1"/>
+          </p:cNvPicPr>
+          <p:nvPr/>
+        </p:nvPicPr>
+        <p:blipFill>
+          <a:blip r:embed="rId3"/>
+          <a:stretch>
+            <a:fillRect/>
+          </a:stretch>
+        </p:blipFill>
+        <p:spPr>
+          <a:xfrm>
+            <a:off x="6364941" y="2201194"/>
+            <a:ext cx="5197915" cy="3921700"/>
+          </a:xfrm>
+          <a:prstGeom prst="rect">
+            <a:avLst/>
+          </a:prstGeom>
+        </p:spPr>
+      </p:pic>
     </p:spTree>
     <p:extLst>
       <p:ext uri="{BB962C8B-B14F-4D97-AF65-F5344CB8AC3E}">
-        <p14:creationId xmlns:p14="http://schemas.microsoft.com/office/powerpoint/2010/main" val="1328676004"/>
+        <p14:creationId xmlns:p14="http://schemas.microsoft.com/office/powerpoint/2010/main" val="980256220"/>
       </p:ext>
     </p:extLst>
   </p:cSld>
   <p:clrMapOvr>
     <a:masterClrMapping/>
   </p:clrMapOvr>
-  <mc:AlternateContent xmlns:mc="http://schemas.openxmlformats.org/markup-compatibility/2006" xmlns:p14="http://schemas.microsoft.com/office/powerpoint/2010/main">
-    <mc:Choice Requires="p14">
-      <p:transition p14:dur="10"/>
-    </mc:Choice>
-    <mc:Fallback xmlns="">
-      <p:transition/>
-    </mc:Fallback>
-  </mc:AlternateContent>
 </p:sld>
 </file>
 
@@ -3720,7 +4264,13 @@
       </p:grpSpPr>
       <p:sp>
         <p:nvSpPr>
-          <p:cNvPr id="6" name="Title 5"/>
+          <p:cNvPr id="2" name="Title 1">
+            <a:extLst>
+              <a:ext uri="{FF2B5EF4-FFF2-40B4-BE49-F238E27FC236}">
+                <a16:creationId xmlns:a16="http://schemas.microsoft.com/office/drawing/2014/main" id="{CC843532-6F02-4937-8A66-F42BFBA0396D}"/>
+              </a:ext>
+            </a:extLst>
+          </p:cNvPr>
           <p:cNvSpPr>
             <a:spLocks noGrp="1"/>
           </p:cNvSpPr>
@@ -3734,313 +4284,140 @@
           <a:lstStyle/>
           <a:p>
             <a:r>
-              <a:rPr lang="en-US" dirty="0">
-                <a:latin typeface="Segoe UI Light" panose="020B0502040204020203" pitchFamily="34" charset="0"/>
-                <a:cs typeface="Segoe UI Light" panose="020B0502040204020203" pitchFamily="34" charset="0"/>
-              </a:rPr>
-              <a:t>Progress</a:t>
-            </a:r>
-          </a:p>
-        </p:txBody>
-      </p:sp>
-      <p:sp>
-        <p:nvSpPr>
-          <p:cNvPr id="38" name="Content Placeholder 17"/>
-          <p:cNvSpPr txBox="1">
-            <a:spLocks/>
-          </p:cNvSpPr>
-          <p:nvPr/>
-        </p:nvSpPr>
-        <p:spPr>
-          <a:xfrm>
-            <a:off x="604362" y="1511253"/>
-            <a:ext cx="9059591" cy="2209100"/>
-          </a:xfrm>
-          <a:prstGeom prst="rect">
-            <a:avLst/>
-          </a:prstGeom>
-        </p:spPr>
-        <p:txBody>
-          <a:bodyPr vert="horz" lIns="91440" tIns="45720" rIns="91440" bIns="45720" rtlCol="0">
-            <a:normAutofit/>
-          </a:bodyPr>
-          <a:lstStyle>
-            <a:lvl1pPr marL="228600" indent="-228600" algn="l" defTabSz="914400" rtl="0" eaLnBrk="1" latinLnBrk="0" hangingPunct="1">
-              <a:lnSpc>
-                <a:spcPts val="1800"/>
-              </a:lnSpc>
-              <a:spcBef>
-                <a:spcPts val="1000"/>
-              </a:spcBef>
-              <a:spcAft>
-                <a:spcPts val="1000"/>
-              </a:spcAft>
-              <a:buFont typeface="Arial" panose="020B0604020202020204" pitchFamily="34" charset="0"/>
-              <a:buChar char="•"/>
-              <a:defRPr lang="en-US" sz="1200" kern="1200" smtClean="0">
-                <a:solidFill>
-                  <a:schemeClr val="tx1">
-                    <a:lumMod val="75000"/>
-                    <a:lumOff val="25000"/>
-                  </a:schemeClr>
-                </a:solidFill>
-                <a:latin typeface="+mn-lt"/>
-                <a:ea typeface="+mn-ea"/>
-                <a:cs typeface="+mn-cs"/>
-              </a:defRPr>
-            </a:lvl1pPr>
-            <a:lvl2pPr marL="685800" indent="-228600" algn="l" defTabSz="914400" rtl="0" eaLnBrk="1" latinLnBrk="0" hangingPunct="1">
-              <a:lnSpc>
-                <a:spcPts val="1800"/>
-              </a:lnSpc>
-              <a:spcBef>
-                <a:spcPts val="1000"/>
-              </a:spcBef>
-              <a:spcAft>
-                <a:spcPts val="1000"/>
-              </a:spcAft>
-              <a:buFont typeface="Arial" panose="020B0604020202020204" pitchFamily="34" charset="0"/>
-              <a:buChar char="•"/>
-              <a:defRPr lang="en-US" sz="1200" kern="1200" smtClean="0">
-                <a:solidFill>
-                  <a:schemeClr val="tx1">
-                    <a:lumMod val="75000"/>
-                    <a:lumOff val="25000"/>
-                  </a:schemeClr>
-                </a:solidFill>
-                <a:latin typeface="+mn-lt"/>
-                <a:ea typeface="+mn-ea"/>
-                <a:cs typeface="+mn-cs"/>
-              </a:defRPr>
-            </a:lvl2pPr>
-            <a:lvl3pPr marL="1143000" indent="-228600" algn="l" defTabSz="914400" rtl="0" eaLnBrk="1" latinLnBrk="0" hangingPunct="1">
-              <a:lnSpc>
-                <a:spcPts val="1800"/>
-              </a:lnSpc>
-              <a:spcBef>
-                <a:spcPts val="1000"/>
-              </a:spcBef>
-              <a:spcAft>
-                <a:spcPts val="1000"/>
-              </a:spcAft>
-              <a:buFont typeface="Arial" panose="020B0604020202020204" pitchFamily="34" charset="0"/>
-              <a:buChar char="•"/>
-              <a:defRPr lang="en-US" sz="1200" kern="1200" smtClean="0">
-                <a:solidFill>
-                  <a:schemeClr val="tx1">
-                    <a:lumMod val="75000"/>
-                    <a:lumOff val="25000"/>
-                  </a:schemeClr>
-                </a:solidFill>
-                <a:latin typeface="+mn-lt"/>
-                <a:ea typeface="+mn-ea"/>
-                <a:cs typeface="+mn-cs"/>
-              </a:defRPr>
-            </a:lvl3pPr>
-            <a:lvl4pPr marL="1600200" indent="-228600" algn="l" defTabSz="914400" rtl="0" eaLnBrk="1" latinLnBrk="0" hangingPunct="1">
-              <a:lnSpc>
-                <a:spcPts val="1800"/>
-              </a:lnSpc>
-              <a:spcBef>
-                <a:spcPts val="1000"/>
-              </a:spcBef>
-              <a:spcAft>
-                <a:spcPts val="1000"/>
-              </a:spcAft>
-              <a:buFont typeface="Arial" panose="020B0604020202020204" pitchFamily="34" charset="0"/>
-              <a:buChar char="•"/>
-              <a:defRPr lang="en-US" sz="1200" kern="1200" smtClean="0">
-                <a:solidFill>
-                  <a:schemeClr val="tx1">
-                    <a:lumMod val="75000"/>
-                    <a:lumOff val="25000"/>
-                  </a:schemeClr>
-                </a:solidFill>
-                <a:latin typeface="+mn-lt"/>
-                <a:ea typeface="+mn-ea"/>
-                <a:cs typeface="+mn-cs"/>
-              </a:defRPr>
-            </a:lvl4pPr>
-            <a:lvl5pPr marL="2057400" indent="-228600" algn="l" defTabSz="914400" rtl="0" eaLnBrk="1" latinLnBrk="0" hangingPunct="1">
-              <a:lnSpc>
-                <a:spcPts val="1800"/>
-              </a:lnSpc>
-              <a:spcBef>
-                <a:spcPts val="1000"/>
-              </a:spcBef>
-              <a:spcAft>
-                <a:spcPts val="1000"/>
-              </a:spcAft>
-              <a:buFont typeface="Arial" panose="020B0604020202020204" pitchFamily="34" charset="0"/>
-              <a:buChar char="•"/>
-              <a:defRPr lang="en-US" sz="1200" kern="1200">
-                <a:solidFill>
-                  <a:schemeClr val="tx1">
-                    <a:lumMod val="75000"/>
-                    <a:lumOff val="25000"/>
-                  </a:schemeClr>
-                </a:solidFill>
-                <a:latin typeface="+mn-lt"/>
-                <a:ea typeface="+mn-ea"/>
-                <a:cs typeface="+mn-cs"/>
-              </a:defRPr>
-            </a:lvl5pPr>
-            <a:lvl6pPr marL="2514600" indent="-228600" algn="l" defTabSz="914400" rtl="0" eaLnBrk="1" latinLnBrk="0" hangingPunct="1">
-              <a:lnSpc>
-                <a:spcPct val="90000"/>
-              </a:lnSpc>
-              <a:spcBef>
-                <a:spcPct val="30000"/>
-              </a:spcBef>
-              <a:buFont typeface="Arial" panose="020B0604020202020204" pitchFamily="34" charset="0"/>
-              <a:buChar char="•"/>
-              <a:defRPr sz="1800" kern="1200">
-                <a:solidFill>
-                  <a:schemeClr val="tx1"/>
-                </a:solidFill>
-                <a:latin typeface="+mn-lt"/>
-                <a:ea typeface="+mn-ea"/>
-                <a:cs typeface="+mn-cs"/>
-              </a:defRPr>
-            </a:lvl6pPr>
-            <a:lvl7pPr marL="2971800" indent="-228600" algn="l" defTabSz="914400" rtl="0" eaLnBrk="1" latinLnBrk="0" hangingPunct="1">
-              <a:lnSpc>
-                <a:spcPct val="90000"/>
-              </a:lnSpc>
-              <a:spcBef>
-                <a:spcPct val="30000"/>
-              </a:spcBef>
-              <a:buFont typeface="Arial" panose="020B0604020202020204" pitchFamily="34" charset="0"/>
-              <a:buChar char="•"/>
-              <a:defRPr sz="1800" kern="1200">
-                <a:solidFill>
-                  <a:schemeClr val="tx1"/>
-                </a:solidFill>
-                <a:latin typeface="+mn-lt"/>
-                <a:ea typeface="+mn-ea"/>
-                <a:cs typeface="+mn-cs"/>
-              </a:defRPr>
-            </a:lvl7pPr>
-            <a:lvl8pPr marL="3429000" indent="-228600" algn="l" defTabSz="914400" rtl="0" eaLnBrk="1" latinLnBrk="0" hangingPunct="1">
-              <a:lnSpc>
-                <a:spcPct val="90000"/>
-              </a:lnSpc>
-              <a:spcBef>
-                <a:spcPct val="30000"/>
-              </a:spcBef>
-              <a:buFont typeface="Arial" panose="020B0604020202020204" pitchFamily="34" charset="0"/>
-              <a:buChar char="•"/>
-              <a:defRPr sz="1800" kern="1200">
-                <a:solidFill>
-                  <a:schemeClr val="tx1"/>
-                </a:solidFill>
-                <a:latin typeface="+mn-lt"/>
-                <a:ea typeface="+mn-ea"/>
-                <a:cs typeface="+mn-cs"/>
-              </a:defRPr>
-            </a:lvl8pPr>
-            <a:lvl9pPr marL="3886200" indent="-228600" algn="l" defTabSz="914400" rtl="0" eaLnBrk="1" latinLnBrk="0" hangingPunct="1">
-              <a:lnSpc>
-                <a:spcPct val="90000"/>
-              </a:lnSpc>
-              <a:spcBef>
-                <a:spcPct val="30000"/>
-              </a:spcBef>
-              <a:buFont typeface="Arial" panose="020B0604020202020204" pitchFamily="34" charset="0"/>
-              <a:buChar char="•"/>
-              <a:defRPr sz="1800" kern="1200">
-                <a:solidFill>
-                  <a:schemeClr val="tx1"/>
-                </a:solidFill>
-                <a:latin typeface="+mn-lt"/>
-                <a:ea typeface="+mn-ea"/>
-                <a:cs typeface="+mn-cs"/>
-              </a:defRPr>
-            </a:lvl9pPr>
-          </a:lstStyle>
-          <a:p>
-            <a:pPr marL="0" indent="0">
-              <a:spcAft>
-                <a:spcPts val="2000"/>
-              </a:spcAft>
-              <a:buNone/>
-            </a:pPr>
-            <a:r>
-              <a:rPr lang="en-US" dirty="0">
-                <a:solidFill>
-                  <a:prstClr val="black">
-                    <a:lumMod val="75000"/>
-                    <a:lumOff val="25000"/>
-                  </a:prstClr>
-                </a:solidFill>
-                <a:latin typeface="Segoe UI" panose="020B0502040204020203" pitchFamily="34" charset="0"/>
-                <a:cs typeface="Segoe UI" panose="020B0502040204020203" pitchFamily="34" charset="0"/>
-              </a:rPr>
-              <a:t>While I am looking into various references for measuring quantum volume for quantum neural networks, Effective dimension is a very good measure in quantifying the effectiveness of the quantum models. On the next steps,</a:t>
-            </a:r>
-          </a:p>
-          <a:p>
-            <a:pPr>
-              <a:spcAft>
-                <a:spcPts val="2000"/>
-              </a:spcAft>
-              <a:buAutoNum type="arabicPeriod"/>
-            </a:pPr>
-            <a:r>
-              <a:rPr lang="en-US" dirty="0">
-                <a:solidFill>
-                  <a:prstClr val="black">
-                    <a:lumMod val="75000"/>
-                    <a:lumOff val="25000"/>
-                  </a:prstClr>
-                </a:solidFill>
-                <a:latin typeface="Segoe UI" panose="020B0502040204020203" pitchFamily="34" charset="0"/>
-                <a:cs typeface="Segoe UI" panose="020B0502040204020203" pitchFamily="34" charset="0"/>
-              </a:rPr>
-              <a:t>I will be working on coding the effective dimension measure</a:t>
-            </a:r>
-          </a:p>
-          <a:p>
-            <a:pPr>
-              <a:spcAft>
-                <a:spcPts val="2000"/>
-              </a:spcAft>
-              <a:buAutoNum type="arabicPeriod"/>
-            </a:pPr>
-            <a:r>
-              <a:rPr lang="en-US" dirty="0">
-                <a:solidFill>
-                  <a:prstClr val="black">
-                    <a:lumMod val="75000"/>
-                    <a:lumOff val="25000"/>
-                  </a:prstClr>
-                </a:solidFill>
-                <a:latin typeface="Segoe UI" panose="020B0502040204020203" pitchFamily="34" charset="0"/>
-                <a:cs typeface="Segoe UI" panose="020B0502040204020203" pitchFamily="34" charset="0"/>
-              </a:rPr>
-              <a:t>I am learning more on Error Mitigation as well.</a:t>
-            </a:r>
-          </a:p>
-        </p:txBody>
-      </p:sp>
+              <a:rPr lang="en-US" dirty="0"/>
+              <a:t>Effective Dimension Plot</a:t>
+            </a:r>
+          </a:p>
+        </p:txBody>
+      </p:sp>
+      <p:pic>
+        <p:nvPicPr>
+          <p:cNvPr id="5" name="Content Placeholder 4" descr="Chart&#10;&#10;Description automatically generated">
+            <a:extLst>
+              <a:ext uri="{FF2B5EF4-FFF2-40B4-BE49-F238E27FC236}">
+                <a16:creationId xmlns:a16="http://schemas.microsoft.com/office/drawing/2014/main" id="{0B3E0619-C154-4CD1-B9E3-22E577027407}"/>
+              </a:ext>
+            </a:extLst>
+          </p:cNvPr>
+          <p:cNvPicPr>
+            <a:picLocks noGrp="1" noChangeAspect="1"/>
+          </p:cNvPicPr>
+          <p:nvPr>
+            <p:ph sz="quarter" idx="10"/>
+          </p:nvPr>
+        </p:nvPicPr>
+        <p:blipFill>
+          <a:blip r:embed="rId2"/>
+          <a:stretch>
+            <a:fillRect/>
+          </a:stretch>
+        </p:blipFill>
+        <p:spPr>
+          <a:xfrm>
+            <a:off x="1534219" y="1509810"/>
+            <a:ext cx="9384793" cy="4900134"/>
+          </a:xfrm>
+        </p:spPr>
+      </p:pic>
     </p:spTree>
     <p:extLst>
       <p:ext uri="{BB962C8B-B14F-4D97-AF65-F5344CB8AC3E}">
-        <p14:creationId xmlns:p14="http://schemas.microsoft.com/office/powerpoint/2010/main" val="727668169"/>
+        <p14:creationId xmlns:p14="http://schemas.microsoft.com/office/powerpoint/2010/main" val="3617982182"/>
       </p:ext>
     </p:extLst>
   </p:cSld>
   <p:clrMapOvr>
     <a:masterClrMapping/>
   </p:clrMapOvr>
-  <mc:AlternateContent xmlns:mc="http://schemas.openxmlformats.org/markup-compatibility/2006" xmlns:p14="http://schemas.microsoft.com/office/powerpoint/2010/main">
-    <mc:Choice Requires="p14">
-      <p:transition p14:dur="10"/>
-    </mc:Choice>
-    <mc:Fallback xmlns="">
-      <p:transition/>
-    </mc:Fallback>
-  </mc:AlternateContent>
+</p:sld>
+</file>
+
+<file path=ppt/slides/slide9.xml><?xml version="1.0" encoding="utf-8"?>
+<p:sld xmlns:a="http://schemas.openxmlformats.org/drawingml/2006/main" xmlns:r="http://schemas.openxmlformats.org/officeDocument/2006/relationships" xmlns:p="http://schemas.openxmlformats.org/presentationml/2006/main">
+  <p:cSld>
+    <p:spTree>
+      <p:nvGrpSpPr>
+        <p:cNvPr id="1" name=""/>
+        <p:cNvGrpSpPr/>
+        <p:nvPr/>
+      </p:nvGrpSpPr>
+      <p:grpSpPr>
+        <a:xfrm>
+          <a:off x="0" y="0"/>
+          <a:ext cx="0" cy="0"/>
+          <a:chOff x="0" y="0"/>
+          <a:chExt cx="0" cy="0"/>
+        </a:xfrm>
+      </p:grpSpPr>
+      <p:sp>
+        <p:nvSpPr>
+          <p:cNvPr id="2" name="Title 1">
+            <a:extLst>
+              <a:ext uri="{FF2B5EF4-FFF2-40B4-BE49-F238E27FC236}">
+                <a16:creationId xmlns:a16="http://schemas.microsoft.com/office/drawing/2014/main" id="{AF6E429A-232A-416E-992E-3077B9AD3D83}"/>
+              </a:ext>
+            </a:extLst>
+          </p:cNvPr>
+          <p:cNvSpPr>
+            <a:spLocks noGrp="1"/>
+          </p:cNvSpPr>
+          <p:nvPr>
+            <p:ph type="title"/>
+          </p:nvPr>
+        </p:nvSpPr>
+        <p:spPr/>
+        <p:txBody>
+          <a:bodyPr>
+            <a:normAutofit/>
+          </a:bodyPr>
+          <a:lstStyle/>
+          <a:p>
+            <a:r>
+              <a:rPr lang="en-US" dirty="0"/>
+              <a:t>Eigen Value Histogram Plot</a:t>
+            </a:r>
+          </a:p>
+        </p:txBody>
+      </p:sp>
+      <p:pic>
+        <p:nvPicPr>
+          <p:cNvPr id="5" name="Content Placeholder 4" descr="Chart&#10;&#10;Description automatically generated">
+            <a:extLst>
+              <a:ext uri="{FF2B5EF4-FFF2-40B4-BE49-F238E27FC236}">
+                <a16:creationId xmlns:a16="http://schemas.microsoft.com/office/drawing/2014/main" id="{A8F52F60-3B62-4CD2-A718-E046212EECED}"/>
+              </a:ext>
+            </a:extLst>
+          </p:cNvPr>
+          <p:cNvPicPr>
+            <a:picLocks noGrp="1" noChangeAspect="1"/>
+          </p:cNvPicPr>
+          <p:nvPr>
+            <p:ph sz="quarter" idx="10"/>
+          </p:nvPr>
+        </p:nvPicPr>
+        <p:blipFill>
+          <a:blip r:embed="rId2"/>
+          <a:stretch>
+            <a:fillRect/>
+          </a:stretch>
+        </p:blipFill>
+        <p:spPr>
+          <a:xfrm>
+            <a:off x="700181" y="1223303"/>
+            <a:ext cx="10791638" cy="5634697"/>
+          </a:xfrm>
+        </p:spPr>
+      </p:pic>
+    </p:spTree>
+    <p:extLst>
+      <p:ext uri="{BB962C8B-B14F-4D97-AF65-F5344CB8AC3E}">
+        <p14:creationId xmlns:p14="http://schemas.microsoft.com/office/powerpoint/2010/main" val="3902949574"/>
+      </p:ext>
+    </p:extLst>
+  </p:cSld>
+  <p:clrMapOvr>
+    <a:masterClrMapping/>
+  </p:clrMapOvr>
 </p:sld>
 </file>
 

</xml_diff>

<commit_message>
Updated documentation of Report
</commit_message>
<xml_diff>
--- a/slides/13. The Power of Quantum Neural Networks.pptx
+++ b/slides/13. The Power of Quantum Neural Networks.pptx
@@ -5,23 +5,24 @@
     <p:sldMasterId id="2147483660" r:id="rId1"/>
   </p:sldMasterIdLst>
   <p:notesMasterIdLst>
-    <p:notesMasterId r:id="rId13"/>
+    <p:notesMasterId r:id="rId14"/>
   </p:notesMasterIdLst>
   <p:handoutMasterIdLst>
-    <p:handoutMasterId r:id="rId14"/>
+    <p:handoutMasterId r:id="rId15"/>
   </p:handoutMasterIdLst>
   <p:sldIdLst>
     <p:sldId id="256" r:id="rId2"/>
-    <p:sldId id="271" r:id="rId3"/>
-    <p:sldId id="279" r:id="rId4"/>
-    <p:sldId id="281" r:id="rId5"/>
-    <p:sldId id="280" r:id="rId6"/>
-    <p:sldId id="282" r:id="rId7"/>
-    <p:sldId id="283" r:id="rId8"/>
-    <p:sldId id="284" r:id="rId9"/>
-    <p:sldId id="285" r:id="rId10"/>
-    <p:sldId id="257" r:id="rId11"/>
-    <p:sldId id="275" r:id="rId12"/>
+    <p:sldId id="275" r:id="rId3"/>
+    <p:sldId id="271" r:id="rId4"/>
+    <p:sldId id="279" r:id="rId5"/>
+    <p:sldId id="281" r:id="rId6"/>
+    <p:sldId id="280" r:id="rId7"/>
+    <p:sldId id="282" r:id="rId8"/>
+    <p:sldId id="283" r:id="rId9"/>
+    <p:sldId id="284" r:id="rId10"/>
+    <p:sldId id="285" r:id="rId11"/>
+    <p:sldId id="257" r:id="rId12"/>
+    <p:sldId id="286" r:id="rId13"/>
   </p:sldIdLst>
   <p:sldSz cx="12192000" cy="6858000"/>
   <p:notesSz cx="6858000" cy="9144000"/>
@@ -230,7 +231,7 @@
           <a:p>
             <a:fld id="{80680FBE-A8DF-4758-9AC4-3A9E1039168F}" type="datetimeFigureOut">
               <a:rPr lang="en-US" smtClean="0"/>
-              <a:t>4/5/2022</a:t>
+              <a:t>4/8/2022</a:t>
             </a:fld>
             <a:endParaRPr lang="en-US" dirty="0"/>
           </a:p>
@@ -395,7 +396,7 @@
           <a:p>
             <a:fld id="{EC13577B-6902-467D-A26C-08A0DD5E4E03}" type="datetimeFigureOut">
               <a:rPr lang="en-US" smtClean="0"/>
-              <a:t>4/5/2022</a:t>
+              <a:t>4/8/2022</a:t>
             </a:fld>
             <a:endParaRPr lang="en-US" dirty="0"/>
           </a:p>
@@ -1190,7 +1191,7 @@
             <a:fld id="{8BEEBAAA-29B5-4AF5-BC5F-7E580C29002D}" type="datetimeFigureOut">
               <a:rPr lang="en-US" smtClean="0"/>
               <a:pPr/>
-              <a:t>4/5/2022</a:t>
+              <a:t>4/8/2022</a:t>
             </a:fld>
             <a:endParaRPr lang="en-US" dirty="0"/>
           </a:p>
@@ -1816,7 +1817,7 @@
             <a:fld id="{8BEEBAAA-29B5-4AF5-BC5F-7E580C29002D}" type="datetimeFigureOut">
               <a:rPr lang="en-US" smtClean="0"/>
               <a:pPr/>
-              <a:t>4/5/2022</a:t>
+              <a:t>4/8/2022</a:t>
             </a:fld>
             <a:endParaRPr lang="en-US" dirty="0"/>
           </a:p>
@@ -2397,6 +2398,95 @@
       </p:grpSpPr>
       <p:sp>
         <p:nvSpPr>
+          <p:cNvPr id="2" name="Title 1">
+            <a:extLst>
+              <a:ext uri="{FF2B5EF4-FFF2-40B4-BE49-F238E27FC236}">
+                <a16:creationId xmlns:a16="http://schemas.microsoft.com/office/drawing/2014/main" id="{AF6E429A-232A-416E-992E-3077B9AD3D83}"/>
+              </a:ext>
+            </a:extLst>
+          </p:cNvPr>
+          <p:cNvSpPr>
+            <a:spLocks noGrp="1"/>
+          </p:cNvSpPr>
+          <p:nvPr>
+            <p:ph type="title"/>
+          </p:nvPr>
+        </p:nvSpPr>
+        <p:spPr/>
+        <p:txBody>
+          <a:bodyPr>
+            <a:normAutofit/>
+          </a:bodyPr>
+          <a:lstStyle/>
+          <a:p>
+            <a:r>
+              <a:rPr lang="en-US" dirty="0"/>
+              <a:t>Eigen Value Histogram Plot</a:t>
+            </a:r>
+          </a:p>
+        </p:txBody>
+      </p:sp>
+      <p:pic>
+        <p:nvPicPr>
+          <p:cNvPr id="5" name="Content Placeholder 4" descr="Chart&#10;&#10;Description automatically generated">
+            <a:extLst>
+              <a:ext uri="{FF2B5EF4-FFF2-40B4-BE49-F238E27FC236}">
+                <a16:creationId xmlns:a16="http://schemas.microsoft.com/office/drawing/2014/main" id="{A8F52F60-3B62-4CD2-A718-E046212EECED}"/>
+              </a:ext>
+            </a:extLst>
+          </p:cNvPr>
+          <p:cNvPicPr>
+            <a:picLocks noGrp="1" noChangeAspect="1"/>
+          </p:cNvPicPr>
+          <p:nvPr>
+            <p:ph sz="quarter" idx="10"/>
+          </p:nvPr>
+        </p:nvPicPr>
+        <p:blipFill>
+          <a:blip r:embed="rId2"/>
+          <a:stretch>
+            <a:fillRect/>
+          </a:stretch>
+        </p:blipFill>
+        <p:spPr>
+          <a:xfrm>
+            <a:off x="700181" y="1223303"/>
+            <a:ext cx="10791638" cy="5634697"/>
+          </a:xfrm>
+        </p:spPr>
+      </p:pic>
+    </p:spTree>
+    <p:extLst>
+      <p:ext uri="{BB962C8B-B14F-4D97-AF65-F5344CB8AC3E}">
+        <p14:creationId xmlns:p14="http://schemas.microsoft.com/office/powerpoint/2010/main" val="3902949574"/>
+      </p:ext>
+    </p:extLst>
+  </p:cSld>
+  <p:clrMapOvr>
+    <a:masterClrMapping/>
+  </p:clrMapOvr>
+</p:sld>
+</file>
+
+<file path=ppt/slides/slide11.xml><?xml version="1.0" encoding="utf-8"?>
+<p:sld xmlns:a="http://schemas.openxmlformats.org/drawingml/2006/main" xmlns:r="http://schemas.openxmlformats.org/officeDocument/2006/relationships" xmlns:p="http://schemas.openxmlformats.org/presentationml/2006/main">
+  <p:cSld>
+    <p:spTree>
+      <p:nvGrpSpPr>
+        <p:cNvPr id="1" name=""/>
+        <p:cNvGrpSpPr/>
+        <p:nvPr/>
+      </p:nvGrpSpPr>
+      <p:grpSpPr>
+        <a:xfrm>
+          <a:off x="0" y="0"/>
+          <a:ext cx="0" cy="0"/>
+          <a:chOff x="0" y="0"/>
+          <a:chExt cx="0" cy="0"/>
+        </a:xfrm>
+      </p:grpSpPr>
+      <p:sp>
+        <p:nvSpPr>
           <p:cNvPr id="2" name="Title 1"/>
           <p:cNvSpPr>
             <a:spLocks noGrp="1"/>
@@ -2614,7 +2704,7 @@
 </p:sld>
 </file>
 
-<file path=ppt/slides/slide11.xml><?xml version="1.0" encoding="utf-8"?>
+<file path=ppt/slides/slide12.xml><?xml version="1.0" encoding="utf-8"?>
 <p:sld xmlns:a="http://schemas.openxmlformats.org/drawingml/2006/main" xmlns:r="http://schemas.openxmlformats.org/officeDocument/2006/relationships" xmlns:p="http://schemas.openxmlformats.org/presentationml/2006/main">
   <p:cSld>
     <p:spTree>
@@ -2633,7 +2723,13 @@
       </p:grpSpPr>
       <p:sp>
         <p:nvSpPr>
-          <p:cNvPr id="6" name="Title 5"/>
+          <p:cNvPr id="2" name="Title 1">
+            <a:extLst>
+              <a:ext uri="{FF2B5EF4-FFF2-40B4-BE49-F238E27FC236}">
+                <a16:creationId xmlns:a16="http://schemas.microsoft.com/office/drawing/2014/main" id="{E1FC45A8-BD9D-40B3-A18C-1214E0EDE35B}"/>
+              </a:ext>
+            </a:extLst>
+          </p:cNvPr>
           <p:cNvSpPr>
             <a:spLocks noGrp="1"/>
           </p:cNvSpPr>
@@ -2647,313 +2743,122 @@
           <a:lstStyle/>
           <a:p>
             <a:r>
-              <a:rPr lang="en-US" dirty="0">
-                <a:latin typeface="Segoe UI Light" panose="020B0502040204020203" pitchFamily="34" charset="0"/>
-                <a:cs typeface="Segoe UI Light" panose="020B0502040204020203" pitchFamily="34" charset="0"/>
-              </a:rPr>
-              <a:t>Progress</a:t>
-            </a:r>
-          </a:p>
-        </p:txBody>
-      </p:sp>
-      <p:sp>
-        <p:nvSpPr>
-          <p:cNvPr id="38" name="Content Placeholder 17"/>
-          <p:cNvSpPr txBox="1">
-            <a:spLocks/>
+              <a:rPr lang="en-US" dirty="0"/>
+              <a:t>Progress &amp; Next Steps</a:t>
+            </a:r>
+          </a:p>
+        </p:txBody>
+      </p:sp>
+      <p:sp>
+        <p:nvSpPr>
+          <p:cNvPr id="3" name="Content Placeholder 2">
+            <a:extLst>
+              <a:ext uri="{FF2B5EF4-FFF2-40B4-BE49-F238E27FC236}">
+                <a16:creationId xmlns:a16="http://schemas.microsoft.com/office/drawing/2014/main" id="{CF3F63CD-90F3-4ACB-B8CF-AD6DC328B04E}"/>
+              </a:ext>
+            </a:extLst>
+          </p:cNvPr>
+          <p:cNvSpPr>
+            <a:spLocks noGrp="1"/>
           </p:cNvSpPr>
-          <p:nvPr/>
-        </p:nvSpPr>
-        <p:spPr>
-          <a:xfrm>
-            <a:off x="604362" y="1511253"/>
-            <a:ext cx="9059591" cy="2209100"/>
-          </a:xfrm>
-          <a:prstGeom prst="rect">
-            <a:avLst/>
-          </a:prstGeom>
-        </p:spPr>
-        <p:txBody>
-          <a:bodyPr vert="horz" lIns="91440" tIns="45720" rIns="91440" bIns="45720" rtlCol="0">
-            <a:normAutofit/>
-          </a:bodyPr>
-          <a:lstStyle>
-            <a:lvl1pPr marL="228600" indent="-228600" algn="l" defTabSz="914400" rtl="0" eaLnBrk="1" latinLnBrk="0" hangingPunct="1">
-              <a:lnSpc>
-                <a:spcPts val="1800"/>
-              </a:lnSpc>
-              <a:spcBef>
-                <a:spcPts val="1000"/>
-              </a:spcBef>
-              <a:spcAft>
-                <a:spcPts val="1000"/>
-              </a:spcAft>
-              <a:buFont typeface="Arial" panose="020B0604020202020204" pitchFamily="34" charset="0"/>
-              <a:buChar char="•"/>
-              <a:defRPr lang="en-US" sz="1200" kern="1200" smtClean="0">
-                <a:solidFill>
-                  <a:schemeClr val="tx1">
-                    <a:lumMod val="75000"/>
-                    <a:lumOff val="25000"/>
-                  </a:schemeClr>
-                </a:solidFill>
-                <a:latin typeface="+mn-lt"/>
-                <a:ea typeface="+mn-ea"/>
-                <a:cs typeface="+mn-cs"/>
-              </a:defRPr>
-            </a:lvl1pPr>
-            <a:lvl2pPr marL="685800" indent="-228600" algn="l" defTabSz="914400" rtl="0" eaLnBrk="1" latinLnBrk="0" hangingPunct="1">
-              <a:lnSpc>
-                <a:spcPts val="1800"/>
-              </a:lnSpc>
-              <a:spcBef>
-                <a:spcPts val="1000"/>
-              </a:spcBef>
-              <a:spcAft>
-                <a:spcPts val="1000"/>
-              </a:spcAft>
-              <a:buFont typeface="Arial" panose="020B0604020202020204" pitchFamily="34" charset="0"/>
-              <a:buChar char="•"/>
-              <a:defRPr lang="en-US" sz="1200" kern="1200" smtClean="0">
-                <a:solidFill>
-                  <a:schemeClr val="tx1">
-                    <a:lumMod val="75000"/>
-                    <a:lumOff val="25000"/>
-                  </a:schemeClr>
-                </a:solidFill>
-                <a:latin typeface="+mn-lt"/>
-                <a:ea typeface="+mn-ea"/>
-                <a:cs typeface="+mn-cs"/>
-              </a:defRPr>
-            </a:lvl2pPr>
-            <a:lvl3pPr marL="1143000" indent="-228600" algn="l" defTabSz="914400" rtl="0" eaLnBrk="1" latinLnBrk="0" hangingPunct="1">
-              <a:lnSpc>
-                <a:spcPts val="1800"/>
-              </a:lnSpc>
-              <a:spcBef>
-                <a:spcPts val="1000"/>
-              </a:spcBef>
-              <a:spcAft>
-                <a:spcPts val="1000"/>
-              </a:spcAft>
-              <a:buFont typeface="Arial" panose="020B0604020202020204" pitchFamily="34" charset="0"/>
-              <a:buChar char="•"/>
-              <a:defRPr lang="en-US" sz="1200" kern="1200" smtClean="0">
-                <a:solidFill>
-                  <a:schemeClr val="tx1">
-                    <a:lumMod val="75000"/>
-                    <a:lumOff val="25000"/>
-                  </a:schemeClr>
-                </a:solidFill>
-                <a:latin typeface="+mn-lt"/>
-                <a:ea typeface="+mn-ea"/>
-                <a:cs typeface="+mn-cs"/>
-              </a:defRPr>
-            </a:lvl3pPr>
-            <a:lvl4pPr marL="1600200" indent="-228600" algn="l" defTabSz="914400" rtl="0" eaLnBrk="1" latinLnBrk="0" hangingPunct="1">
-              <a:lnSpc>
-                <a:spcPts val="1800"/>
-              </a:lnSpc>
-              <a:spcBef>
-                <a:spcPts val="1000"/>
-              </a:spcBef>
-              <a:spcAft>
-                <a:spcPts val="1000"/>
-              </a:spcAft>
-              <a:buFont typeface="Arial" panose="020B0604020202020204" pitchFamily="34" charset="0"/>
-              <a:buChar char="•"/>
-              <a:defRPr lang="en-US" sz="1200" kern="1200" smtClean="0">
-                <a:solidFill>
-                  <a:schemeClr val="tx1">
-                    <a:lumMod val="75000"/>
-                    <a:lumOff val="25000"/>
-                  </a:schemeClr>
-                </a:solidFill>
-                <a:latin typeface="+mn-lt"/>
-                <a:ea typeface="+mn-ea"/>
-                <a:cs typeface="+mn-cs"/>
-              </a:defRPr>
-            </a:lvl4pPr>
-            <a:lvl5pPr marL="2057400" indent="-228600" algn="l" defTabSz="914400" rtl="0" eaLnBrk="1" latinLnBrk="0" hangingPunct="1">
-              <a:lnSpc>
-                <a:spcPts val="1800"/>
-              </a:lnSpc>
-              <a:spcBef>
-                <a:spcPts val="1000"/>
-              </a:spcBef>
-              <a:spcAft>
-                <a:spcPts val="1000"/>
-              </a:spcAft>
-              <a:buFont typeface="Arial" panose="020B0604020202020204" pitchFamily="34" charset="0"/>
-              <a:buChar char="•"/>
-              <a:defRPr lang="en-US" sz="1200" kern="1200">
-                <a:solidFill>
-                  <a:schemeClr val="tx1">
-                    <a:lumMod val="75000"/>
-                    <a:lumOff val="25000"/>
-                  </a:schemeClr>
-                </a:solidFill>
-                <a:latin typeface="+mn-lt"/>
-                <a:ea typeface="+mn-ea"/>
-                <a:cs typeface="+mn-cs"/>
-              </a:defRPr>
-            </a:lvl5pPr>
-            <a:lvl6pPr marL="2514600" indent="-228600" algn="l" defTabSz="914400" rtl="0" eaLnBrk="1" latinLnBrk="0" hangingPunct="1">
-              <a:lnSpc>
-                <a:spcPct val="90000"/>
-              </a:lnSpc>
-              <a:spcBef>
-                <a:spcPct val="30000"/>
-              </a:spcBef>
-              <a:buFont typeface="Arial" panose="020B0604020202020204" pitchFamily="34" charset="0"/>
-              <a:buChar char="•"/>
-              <a:defRPr sz="1800" kern="1200">
-                <a:solidFill>
-                  <a:schemeClr val="tx1"/>
-                </a:solidFill>
-                <a:latin typeface="+mn-lt"/>
-                <a:ea typeface="+mn-ea"/>
-                <a:cs typeface="+mn-cs"/>
-              </a:defRPr>
-            </a:lvl6pPr>
-            <a:lvl7pPr marL="2971800" indent="-228600" algn="l" defTabSz="914400" rtl="0" eaLnBrk="1" latinLnBrk="0" hangingPunct="1">
-              <a:lnSpc>
-                <a:spcPct val="90000"/>
-              </a:lnSpc>
-              <a:spcBef>
-                <a:spcPct val="30000"/>
-              </a:spcBef>
-              <a:buFont typeface="Arial" panose="020B0604020202020204" pitchFamily="34" charset="0"/>
-              <a:buChar char="•"/>
-              <a:defRPr sz="1800" kern="1200">
-                <a:solidFill>
-                  <a:schemeClr val="tx1"/>
-                </a:solidFill>
-                <a:latin typeface="+mn-lt"/>
-                <a:ea typeface="+mn-ea"/>
-                <a:cs typeface="+mn-cs"/>
-              </a:defRPr>
-            </a:lvl7pPr>
-            <a:lvl8pPr marL="3429000" indent="-228600" algn="l" defTabSz="914400" rtl="0" eaLnBrk="1" latinLnBrk="0" hangingPunct="1">
-              <a:lnSpc>
-                <a:spcPct val="90000"/>
-              </a:lnSpc>
-              <a:spcBef>
-                <a:spcPct val="30000"/>
-              </a:spcBef>
-              <a:buFont typeface="Arial" panose="020B0604020202020204" pitchFamily="34" charset="0"/>
-              <a:buChar char="•"/>
-              <a:defRPr sz="1800" kern="1200">
-                <a:solidFill>
-                  <a:schemeClr val="tx1"/>
-                </a:solidFill>
-                <a:latin typeface="+mn-lt"/>
-                <a:ea typeface="+mn-ea"/>
-                <a:cs typeface="+mn-cs"/>
-              </a:defRPr>
-            </a:lvl8pPr>
-            <a:lvl9pPr marL="3886200" indent="-228600" algn="l" defTabSz="914400" rtl="0" eaLnBrk="1" latinLnBrk="0" hangingPunct="1">
-              <a:lnSpc>
-                <a:spcPct val="90000"/>
-              </a:lnSpc>
-              <a:spcBef>
-                <a:spcPct val="30000"/>
-              </a:spcBef>
-              <a:buFont typeface="Arial" panose="020B0604020202020204" pitchFamily="34" charset="0"/>
-              <a:buChar char="•"/>
-              <a:defRPr sz="1800" kern="1200">
-                <a:solidFill>
-                  <a:schemeClr val="tx1"/>
-                </a:solidFill>
-                <a:latin typeface="+mn-lt"/>
-                <a:ea typeface="+mn-ea"/>
-                <a:cs typeface="+mn-cs"/>
-              </a:defRPr>
-            </a:lvl9pPr>
-          </a:lstStyle>
-          <a:p>
-            <a:pPr marL="0" indent="0">
-              <a:spcAft>
-                <a:spcPts val="2000"/>
-              </a:spcAft>
-              <a:buNone/>
-            </a:pPr>
-            <a:r>
-              <a:rPr lang="en-US" dirty="0">
-                <a:solidFill>
-                  <a:prstClr val="black">
-                    <a:lumMod val="75000"/>
-                    <a:lumOff val="25000"/>
-                  </a:prstClr>
-                </a:solidFill>
-                <a:latin typeface="Segoe UI" panose="020B0502040204020203" pitchFamily="34" charset="0"/>
-                <a:cs typeface="Segoe UI" panose="020B0502040204020203" pitchFamily="34" charset="0"/>
-              </a:rPr>
-              <a:t>While I am looking into various references for measuring quantum volume for quantum neural networks, Effective dimension is a very good measure in quantifying the effectiveness of the quantum models. On the next steps,</a:t>
-            </a:r>
-          </a:p>
-          <a:p>
-            <a:pPr>
-              <a:spcAft>
-                <a:spcPts val="2000"/>
-              </a:spcAft>
+          <p:nvPr>
+            <p:ph sz="quarter" idx="10"/>
+          </p:nvPr>
+        </p:nvSpPr>
+        <p:spPr>
+          <a:xfrm>
+            <a:off x="539495" y="1435607"/>
+            <a:ext cx="9805775" cy="4014933"/>
+          </a:xfrm>
+        </p:spPr>
+        <p:txBody>
+          <a:bodyPr/>
+          <a:lstStyle/>
+          <a:p>
+            <a:r>
+              <a:rPr lang="en-US" sz="2000" dirty="0">
+                <a:solidFill>
+                  <a:srgbClr val="FF0000"/>
+                </a:solidFill>
+                <a:latin typeface="+mj-lt"/>
+              </a:rPr>
+              <a:t>This Week</a:t>
+            </a:r>
+          </a:p>
+          <a:p>
+            <a:pPr marL="228600" indent="-228600">
               <a:buAutoNum type="arabicPeriod"/>
             </a:pPr>
             <a:r>
-              <a:rPr lang="en-US" dirty="0">
-                <a:solidFill>
-                  <a:prstClr val="black">
-                    <a:lumMod val="75000"/>
-                    <a:lumOff val="25000"/>
-                  </a:prstClr>
-                </a:solidFill>
-                <a:latin typeface="Segoe UI" panose="020B0502040204020203" pitchFamily="34" charset="0"/>
-                <a:cs typeface="Segoe UI" panose="020B0502040204020203" pitchFamily="34" charset="0"/>
-              </a:rPr>
-              <a:t>I will be working on coding the effective dimension measure</a:t>
-            </a:r>
-          </a:p>
-          <a:p>
-            <a:pPr>
-              <a:spcAft>
-                <a:spcPts val="2000"/>
-              </a:spcAft>
+              <a:rPr lang="en-US" dirty="0"/>
+              <a:t>Completed Implementation of Effective Dimension and pushed that to the library ‘</a:t>
+            </a:r>
+            <a:r>
+              <a:rPr lang="en-US" dirty="0" err="1"/>
+              <a:t>qmetrics</a:t>
+            </a:r>
+            <a:r>
+              <a:rPr lang="en-US" dirty="0"/>
+              <a:t>’</a:t>
+            </a:r>
+          </a:p>
+          <a:p>
+            <a:pPr marL="228600" indent="-228600">
               <a:buAutoNum type="arabicPeriod"/>
             </a:pPr>
             <a:r>
+              <a:rPr lang="en-US" dirty="0"/>
+              <a:t>Working on updating my working document on error mitigation and the power of quantum neural networks</a:t>
+            </a:r>
+          </a:p>
+          <a:p>
+            <a:pPr marL="228600" indent="-228600">
+              <a:buAutoNum type="arabicPeriod"/>
+            </a:pPr>
+            <a:r>
+              <a:rPr lang="en-US" dirty="0"/>
+              <a:t>Worked on simulating QFT in JS</a:t>
+            </a:r>
+          </a:p>
+          <a:p>
+            <a:r>
+              <a:rPr lang="en-US" sz="2000" dirty="0">
+                <a:solidFill>
+                  <a:srgbClr val="FF0000"/>
+                </a:solidFill>
+                <a:latin typeface="+mj-lt"/>
+              </a:rPr>
+              <a:t>Next Steps</a:t>
+            </a:r>
+          </a:p>
+          <a:p>
+            <a:r>
               <a:rPr lang="en-US" dirty="0">
                 <a:solidFill>
-                  <a:prstClr val="black">
-                    <a:lumMod val="75000"/>
-                    <a:lumOff val="25000"/>
-                  </a:prstClr>
-                </a:solidFill>
-                <a:latin typeface="Segoe UI" panose="020B0502040204020203" pitchFamily="34" charset="0"/>
-                <a:cs typeface="Segoe UI" panose="020B0502040204020203" pitchFamily="34" charset="0"/>
-              </a:rPr>
-              <a:t>I am learning more on Error Mitigation as well.</a:t>
-            </a:r>
+                  <a:schemeClr val="tx1"/>
+                </a:solidFill>
+              </a:rPr>
+              <a:t>Completely focus on showcasing other metrics on Benchmarking Quantum neural networks</a:t>
+            </a:r>
+          </a:p>
+          <a:p>
+            <a:pPr marL="228600" indent="-228600">
+              <a:buAutoNum type="arabicPeriod"/>
+            </a:pPr>
+            <a:endParaRPr lang="en-US" dirty="0"/>
           </a:p>
         </p:txBody>
       </p:sp>
     </p:spTree>
     <p:extLst>
       <p:ext uri="{BB962C8B-B14F-4D97-AF65-F5344CB8AC3E}">
-        <p14:creationId xmlns:p14="http://schemas.microsoft.com/office/powerpoint/2010/main" val="727668169"/>
+        <p14:creationId xmlns:p14="http://schemas.microsoft.com/office/powerpoint/2010/main" val="2367652067"/>
       </p:ext>
     </p:extLst>
   </p:cSld>
   <p:clrMapOvr>
     <a:masterClrMapping/>
   </p:clrMapOvr>
-  <mc:AlternateContent xmlns:mc="http://schemas.openxmlformats.org/markup-compatibility/2006" xmlns:p14="http://schemas.microsoft.com/office/powerpoint/2010/main">
-    <mc:Choice Requires="p14">
-      <p:transition p14:dur="10"/>
-    </mc:Choice>
-    <mc:Fallback xmlns="">
-      <p:transition/>
-    </mc:Fallback>
-  </mc:AlternateContent>
 </p:sld>
 </file>
 
@@ -2976,7 +2881,7 @@
       </p:grpSpPr>
       <p:sp>
         <p:nvSpPr>
-          <p:cNvPr id="8" name="Title 7"/>
+          <p:cNvPr id="6" name="Title 5"/>
           <p:cNvSpPr>
             <a:spLocks noGrp="1"/>
           </p:cNvSpPr>
@@ -2986,9 +2891,7 @@
         </p:nvSpPr>
         <p:spPr/>
         <p:txBody>
-          <a:bodyPr>
-            <a:noAutofit/>
-          </a:bodyPr>
+          <a:bodyPr/>
           <a:lstStyle/>
           <a:p>
             <a:r>
@@ -2996,44 +2899,322 @@
                 <a:latin typeface="Segoe UI Light" panose="020B0502040204020203" pitchFamily="34" charset="0"/>
                 <a:cs typeface="Segoe UI Light" panose="020B0502040204020203" pitchFamily="34" charset="0"/>
               </a:rPr>
-              <a:t>Parameter Space vs Model Space</a:t>
-            </a:r>
-          </a:p>
-        </p:txBody>
-      </p:sp>
-      <p:pic>
-        <p:nvPicPr>
-          <p:cNvPr id="3" name="Picture 2">
-            <a:extLst>
-              <a:ext uri="{FF2B5EF4-FFF2-40B4-BE49-F238E27FC236}">
-                <a16:creationId xmlns:a16="http://schemas.microsoft.com/office/drawing/2014/main" id="{781637FA-5321-411C-94A8-17D90C27F404}"/>
-              </a:ext>
-            </a:extLst>
-          </p:cNvPr>
-          <p:cNvPicPr>
-            <a:picLocks noChangeAspect="1"/>
-          </p:cNvPicPr>
+              <a:t>Progress</a:t>
+            </a:r>
+          </a:p>
+        </p:txBody>
+      </p:sp>
+      <p:sp>
+        <p:nvSpPr>
+          <p:cNvPr id="38" name="Content Placeholder 17"/>
+          <p:cNvSpPr txBox="1">
+            <a:spLocks/>
+          </p:cNvSpPr>
           <p:nvPr/>
-        </p:nvPicPr>
-        <p:blipFill rotWithShape="1">
-          <a:blip r:embed="rId2"/>
-          <a:srcRect t="8945" b="290"/>
-          <a:stretch/>
-        </p:blipFill>
-        <p:spPr>
-          <a:xfrm>
-            <a:off x="663390" y="1531721"/>
-            <a:ext cx="6672004" cy="3794558"/>
+        </p:nvSpPr>
+        <p:spPr>
+          <a:xfrm>
+            <a:off x="604362" y="1511252"/>
+            <a:ext cx="9059591" cy="4539923"/>
           </a:xfrm>
           <a:prstGeom prst="rect">
             <a:avLst/>
           </a:prstGeom>
         </p:spPr>
-      </p:pic>
+        <p:txBody>
+          <a:bodyPr vert="horz" lIns="91440" tIns="45720" rIns="91440" bIns="45720" rtlCol="0">
+            <a:normAutofit/>
+          </a:bodyPr>
+          <a:lstStyle>
+            <a:lvl1pPr marL="228600" indent="-228600" algn="l" defTabSz="914400" rtl="0" eaLnBrk="1" latinLnBrk="0" hangingPunct="1">
+              <a:lnSpc>
+                <a:spcPts val="1800"/>
+              </a:lnSpc>
+              <a:spcBef>
+                <a:spcPts val="1000"/>
+              </a:spcBef>
+              <a:spcAft>
+                <a:spcPts val="1000"/>
+              </a:spcAft>
+              <a:buFont typeface="Arial" panose="020B0604020202020204" pitchFamily="34" charset="0"/>
+              <a:buChar char="•"/>
+              <a:defRPr lang="en-US" sz="1200" kern="1200" smtClean="0">
+                <a:solidFill>
+                  <a:schemeClr val="tx1">
+                    <a:lumMod val="75000"/>
+                    <a:lumOff val="25000"/>
+                  </a:schemeClr>
+                </a:solidFill>
+                <a:latin typeface="+mn-lt"/>
+                <a:ea typeface="+mn-ea"/>
+                <a:cs typeface="+mn-cs"/>
+              </a:defRPr>
+            </a:lvl1pPr>
+            <a:lvl2pPr marL="685800" indent="-228600" algn="l" defTabSz="914400" rtl="0" eaLnBrk="1" latinLnBrk="0" hangingPunct="1">
+              <a:lnSpc>
+                <a:spcPts val="1800"/>
+              </a:lnSpc>
+              <a:spcBef>
+                <a:spcPts val="1000"/>
+              </a:spcBef>
+              <a:spcAft>
+                <a:spcPts val="1000"/>
+              </a:spcAft>
+              <a:buFont typeface="Arial" panose="020B0604020202020204" pitchFamily="34" charset="0"/>
+              <a:buChar char="•"/>
+              <a:defRPr lang="en-US" sz="1200" kern="1200" smtClean="0">
+                <a:solidFill>
+                  <a:schemeClr val="tx1">
+                    <a:lumMod val="75000"/>
+                    <a:lumOff val="25000"/>
+                  </a:schemeClr>
+                </a:solidFill>
+                <a:latin typeface="+mn-lt"/>
+                <a:ea typeface="+mn-ea"/>
+                <a:cs typeface="+mn-cs"/>
+              </a:defRPr>
+            </a:lvl2pPr>
+            <a:lvl3pPr marL="1143000" indent="-228600" algn="l" defTabSz="914400" rtl="0" eaLnBrk="1" latinLnBrk="0" hangingPunct="1">
+              <a:lnSpc>
+                <a:spcPts val="1800"/>
+              </a:lnSpc>
+              <a:spcBef>
+                <a:spcPts val="1000"/>
+              </a:spcBef>
+              <a:spcAft>
+                <a:spcPts val="1000"/>
+              </a:spcAft>
+              <a:buFont typeface="Arial" panose="020B0604020202020204" pitchFamily="34" charset="0"/>
+              <a:buChar char="•"/>
+              <a:defRPr lang="en-US" sz="1200" kern="1200" smtClean="0">
+                <a:solidFill>
+                  <a:schemeClr val="tx1">
+                    <a:lumMod val="75000"/>
+                    <a:lumOff val="25000"/>
+                  </a:schemeClr>
+                </a:solidFill>
+                <a:latin typeface="+mn-lt"/>
+                <a:ea typeface="+mn-ea"/>
+                <a:cs typeface="+mn-cs"/>
+              </a:defRPr>
+            </a:lvl3pPr>
+            <a:lvl4pPr marL="1600200" indent="-228600" algn="l" defTabSz="914400" rtl="0" eaLnBrk="1" latinLnBrk="0" hangingPunct="1">
+              <a:lnSpc>
+                <a:spcPts val="1800"/>
+              </a:lnSpc>
+              <a:spcBef>
+                <a:spcPts val="1000"/>
+              </a:spcBef>
+              <a:spcAft>
+                <a:spcPts val="1000"/>
+              </a:spcAft>
+              <a:buFont typeface="Arial" panose="020B0604020202020204" pitchFamily="34" charset="0"/>
+              <a:buChar char="•"/>
+              <a:defRPr lang="en-US" sz="1200" kern="1200" smtClean="0">
+                <a:solidFill>
+                  <a:schemeClr val="tx1">
+                    <a:lumMod val="75000"/>
+                    <a:lumOff val="25000"/>
+                  </a:schemeClr>
+                </a:solidFill>
+                <a:latin typeface="+mn-lt"/>
+                <a:ea typeface="+mn-ea"/>
+                <a:cs typeface="+mn-cs"/>
+              </a:defRPr>
+            </a:lvl4pPr>
+            <a:lvl5pPr marL="2057400" indent="-228600" algn="l" defTabSz="914400" rtl="0" eaLnBrk="1" latinLnBrk="0" hangingPunct="1">
+              <a:lnSpc>
+                <a:spcPts val="1800"/>
+              </a:lnSpc>
+              <a:spcBef>
+                <a:spcPts val="1000"/>
+              </a:spcBef>
+              <a:spcAft>
+                <a:spcPts val="1000"/>
+              </a:spcAft>
+              <a:buFont typeface="Arial" panose="020B0604020202020204" pitchFamily="34" charset="0"/>
+              <a:buChar char="•"/>
+              <a:defRPr lang="en-US" sz="1200" kern="1200">
+                <a:solidFill>
+                  <a:schemeClr val="tx1">
+                    <a:lumMod val="75000"/>
+                    <a:lumOff val="25000"/>
+                  </a:schemeClr>
+                </a:solidFill>
+                <a:latin typeface="+mn-lt"/>
+                <a:ea typeface="+mn-ea"/>
+                <a:cs typeface="+mn-cs"/>
+              </a:defRPr>
+            </a:lvl5pPr>
+            <a:lvl6pPr marL="2514600" indent="-228600" algn="l" defTabSz="914400" rtl="0" eaLnBrk="1" latinLnBrk="0" hangingPunct="1">
+              <a:lnSpc>
+                <a:spcPct val="90000"/>
+              </a:lnSpc>
+              <a:spcBef>
+                <a:spcPct val="30000"/>
+              </a:spcBef>
+              <a:buFont typeface="Arial" panose="020B0604020202020204" pitchFamily="34" charset="0"/>
+              <a:buChar char="•"/>
+              <a:defRPr sz="1800" kern="1200">
+                <a:solidFill>
+                  <a:schemeClr val="tx1"/>
+                </a:solidFill>
+                <a:latin typeface="+mn-lt"/>
+                <a:ea typeface="+mn-ea"/>
+                <a:cs typeface="+mn-cs"/>
+              </a:defRPr>
+            </a:lvl6pPr>
+            <a:lvl7pPr marL="2971800" indent="-228600" algn="l" defTabSz="914400" rtl="0" eaLnBrk="1" latinLnBrk="0" hangingPunct="1">
+              <a:lnSpc>
+                <a:spcPct val="90000"/>
+              </a:lnSpc>
+              <a:spcBef>
+                <a:spcPct val="30000"/>
+              </a:spcBef>
+              <a:buFont typeface="Arial" panose="020B0604020202020204" pitchFamily="34" charset="0"/>
+              <a:buChar char="•"/>
+              <a:defRPr sz="1800" kern="1200">
+                <a:solidFill>
+                  <a:schemeClr val="tx1"/>
+                </a:solidFill>
+                <a:latin typeface="+mn-lt"/>
+                <a:ea typeface="+mn-ea"/>
+                <a:cs typeface="+mn-cs"/>
+              </a:defRPr>
+            </a:lvl7pPr>
+            <a:lvl8pPr marL="3429000" indent="-228600" algn="l" defTabSz="914400" rtl="0" eaLnBrk="1" latinLnBrk="0" hangingPunct="1">
+              <a:lnSpc>
+                <a:spcPct val="90000"/>
+              </a:lnSpc>
+              <a:spcBef>
+                <a:spcPct val="30000"/>
+              </a:spcBef>
+              <a:buFont typeface="Arial" panose="020B0604020202020204" pitchFamily="34" charset="0"/>
+              <a:buChar char="•"/>
+              <a:defRPr sz="1800" kern="1200">
+                <a:solidFill>
+                  <a:schemeClr val="tx1"/>
+                </a:solidFill>
+                <a:latin typeface="+mn-lt"/>
+                <a:ea typeface="+mn-ea"/>
+                <a:cs typeface="+mn-cs"/>
+              </a:defRPr>
+            </a:lvl8pPr>
+            <a:lvl9pPr marL="3886200" indent="-228600" algn="l" defTabSz="914400" rtl="0" eaLnBrk="1" latinLnBrk="0" hangingPunct="1">
+              <a:lnSpc>
+                <a:spcPct val="90000"/>
+              </a:lnSpc>
+              <a:spcBef>
+                <a:spcPct val="30000"/>
+              </a:spcBef>
+              <a:buFont typeface="Arial" panose="020B0604020202020204" pitchFamily="34" charset="0"/>
+              <a:buChar char="•"/>
+              <a:defRPr sz="1800" kern="1200">
+                <a:solidFill>
+                  <a:schemeClr val="tx1"/>
+                </a:solidFill>
+                <a:latin typeface="+mn-lt"/>
+                <a:ea typeface="+mn-ea"/>
+                <a:cs typeface="+mn-cs"/>
+              </a:defRPr>
+            </a:lvl9pPr>
+          </a:lstStyle>
+          <a:p>
+            <a:pPr marL="0" indent="0">
+              <a:spcAft>
+                <a:spcPts val="2000"/>
+              </a:spcAft>
+              <a:buNone/>
+            </a:pPr>
+            <a:r>
+              <a:rPr lang="en-US" dirty="0">
+                <a:solidFill>
+                  <a:prstClr val="black">
+                    <a:lumMod val="75000"/>
+                    <a:lumOff val="25000"/>
+                  </a:prstClr>
+                </a:solidFill>
+                <a:latin typeface="Segoe UI" panose="020B0502040204020203" pitchFamily="34" charset="0"/>
+                <a:cs typeface="Segoe UI" panose="020B0502040204020203" pitchFamily="34" charset="0"/>
+              </a:rPr>
+              <a:t>While I am looking into various references for measuring quantum volume for quantum neural networks, Effective dimension is a very good measure in quantifying the effectiveness of the quantum models. On the next steps,</a:t>
+            </a:r>
+          </a:p>
+          <a:p>
+            <a:pPr>
+              <a:spcAft>
+                <a:spcPts val="2000"/>
+              </a:spcAft>
+              <a:buAutoNum type="arabicPeriod"/>
+            </a:pPr>
+            <a:r>
+              <a:rPr lang="en-US" dirty="0">
+                <a:solidFill>
+                  <a:prstClr val="black">
+                    <a:lumMod val="75000"/>
+                    <a:lumOff val="25000"/>
+                  </a:prstClr>
+                </a:solidFill>
+                <a:latin typeface="Segoe UI" panose="020B0502040204020203" pitchFamily="34" charset="0"/>
+                <a:cs typeface="Segoe UI" panose="020B0502040204020203" pitchFamily="34" charset="0"/>
+              </a:rPr>
+              <a:t>Presented the team on Quantum Performance Metrics</a:t>
+            </a:r>
+          </a:p>
+          <a:p>
+            <a:pPr>
+              <a:spcAft>
+                <a:spcPts val="2000"/>
+              </a:spcAft>
+              <a:buAutoNum type="arabicPeriod"/>
+            </a:pPr>
+            <a:r>
+              <a:rPr lang="en-US" dirty="0">
+                <a:solidFill>
+                  <a:prstClr val="black">
+                    <a:lumMod val="75000"/>
+                    <a:lumOff val="25000"/>
+                  </a:prstClr>
+                </a:solidFill>
+                <a:latin typeface="Segoe UI" panose="020B0502040204020203" pitchFamily="34" charset="0"/>
+                <a:cs typeface="Segoe UI" panose="020B0502040204020203" pitchFamily="34" charset="0"/>
+              </a:rPr>
+              <a:t>Moved Performance metrics and Effective Dimension from test python package index to </a:t>
+            </a:r>
+            <a:r>
+              <a:rPr lang="en-US" dirty="0">
+                <a:solidFill>
+                  <a:prstClr val="black">
+                    <a:lumMod val="75000"/>
+                    <a:lumOff val="25000"/>
+                  </a:prstClr>
+                </a:solidFill>
+                <a:latin typeface="Segoe UI" panose="020B0502040204020203" pitchFamily="34" charset="0"/>
+                <a:cs typeface="Segoe UI" panose="020B0502040204020203" pitchFamily="34" charset="0"/>
+                <a:hlinkClick r:id="rId2"/>
+              </a:rPr>
+              <a:t>http://www.pypi.org</a:t>
+            </a:r>
+            <a:r>
+              <a:rPr lang="en-US" dirty="0">
+                <a:solidFill>
+                  <a:prstClr val="black">
+                    <a:lumMod val="75000"/>
+                    <a:lumOff val="25000"/>
+                  </a:prstClr>
+                </a:solidFill>
+                <a:latin typeface="Segoe UI" panose="020B0502040204020203" pitchFamily="34" charset="0"/>
+                <a:cs typeface="Segoe UI" panose="020B0502040204020203" pitchFamily="34" charset="0"/>
+              </a:rPr>
+              <a:t>, along with samples for using the same.</a:t>
+            </a:r>
+          </a:p>
+        </p:txBody>
+      </p:sp>
     </p:spTree>
     <p:extLst>
       <p:ext uri="{BB962C8B-B14F-4D97-AF65-F5344CB8AC3E}">
-        <p14:creationId xmlns:p14="http://schemas.microsoft.com/office/powerpoint/2010/main" val="3457616166"/>
+        <p14:creationId xmlns:p14="http://schemas.microsoft.com/office/powerpoint/2010/main" val="727668169"/>
       </p:ext>
     </p:extLst>
   </p:cSld>
@@ -3070,7 +3251,7 @@
       </p:grpSpPr>
       <p:sp>
         <p:nvSpPr>
-          <p:cNvPr id="4" name="Title 3"/>
+          <p:cNvPr id="8" name="Title 7"/>
           <p:cNvSpPr>
             <a:spLocks noGrp="1"/>
           </p:cNvSpPr>
@@ -3080,7 +3261,9 @@
         </p:nvSpPr>
         <p:spPr/>
         <p:txBody>
-          <a:bodyPr/>
+          <a:bodyPr>
+            <a:noAutofit/>
+          </a:bodyPr>
           <a:lstStyle/>
           <a:p>
             <a:r>
@@ -3088,7 +3271,7 @@
                 <a:latin typeface="Segoe UI Light" panose="020B0502040204020203" pitchFamily="34" charset="0"/>
                 <a:cs typeface="Segoe UI Light" panose="020B0502040204020203" pitchFamily="34" charset="0"/>
               </a:rPr>
-              <a:t>Effective Dimension</a:t>
+              <a:t>Parameter Space vs Model Space</a:t>
             </a:r>
           </a:p>
         </p:txBody>
@@ -3098,7 +3281,7 @@
           <p:cNvPr id="3" name="Picture 2">
             <a:extLst>
               <a:ext uri="{FF2B5EF4-FFF2-40B4-BE49-F238E27FC236}">
-                <a16:creationId xmlns:a16="http://schemas.microsoft.com/office/drawing/2014/main" id="{E0912AD9-06AC-4679-A21A-84B0BEC5C640}"/>
+                <a16:creationId xmlns:a16="http://schemas.microsoft.com/office/drawing/2014/main" id="{781637FA-5321-411C-94A8-17D90C27F404}"/>
               </a:ext>
             </a:extLst>
           </p:cNvPr>
@@ -3107,138 +3290,25 @@
           </p:cNvPicPr>
           <p:nvPr/>
         </p:nvPicPr>
-        <p:blipFill>
+        <p:blipFill rotWithShape="1">
           <a:blip r:embed="rId2"/>
-          <a:stretch>
-            <a:fillRect/>
-          </a:stretch>
+          <a:srcRect t="8945" b="290"/>
+          <a:stretch/>
         </p:blipFill>
         <p:spPr>
           <a:xfrm>
-            <a:off x="838266" y="1628723"/>
-            <a:ext cx="7221004" cy="3779848"/>
+            <a:off x="663390" y="1531721"/>
+            <a:ext cx="6672004" cy="3794558"/>
           </a:xfrm>
           <a:prstGeom prst="rect">
             <a:avLst/>
           </a:prstGeom>
         </p:spPr>
       </p:pic>
-      <p:sp>
-        <p:nvSpPr>
-          <p:cNvPr id="5" name="TextBox 4">
-            <a:extLst>
-              <a:ext uri="{FF2B5EF4-FFF2-40B4-BE49-F238E27FC236}">
-                <a16:creationId xmlns:a16="http://schemas.microsoft.com/office/drawing/2014/main" id="{F3EF3F4D-B57F-439F-9FBE-14892F1D7A0F}"/>
-              </a:ext>
-            </a:extLst>
-          </p:cNvPr>
-          <p:cNvSpPr txBox="1"/>
-          <p:nvPr/>
-        </p:nvSpPr>
-        <p:spPr>
-          <a:xfrm>
-            <a:off x="8229600" y="1628723"/>
-            <a:ext cx="3726216" cy="1200329"/>
-          </a:xfrm>
-          <a:prstGeom prst="rect">
-            <a:avLst/>
-          </a:prstGeom>
-          <a:noFill/>
-        </p:spPr>
-        <p:txBody>
-          <a:bodyPr wrap="square" rtlCol="0">
-            <a:spAutoFit/>
-          </a:bodyPr>
-          <a:lstStyle/>
-          <a:p>
-            <a:r>
-              <a:rPr lang="en-US" dirty="0">
-                <a:latin typeface="+mj-lt"/>
-              </a:rPr>
-              <a:t>Effective dimension determines the effectiveness of our models. It gives us a sense of irrelevant features, </a:t>
-            </a:r>
-          </a:p>
-          <a:p>
-            <a:r>
-              <a:rPr lang="en-US" dirty="0">
-                <a:latin typeface="+mj-lt"/>
-              </a:rPr>
-              <a:t>flat landscapes, etc.</a:t>
-            </a:r>
-          </a:p>
-        </p:txBody>
-      </p:sp>
-      <p:sp>
-        <p:nvSpPr>
-          <p:cNvPr id="26" name="TextBox 25">
-            <a:extLst>
-              <a:ext uri="{FF2B5EF4-FFF2-40B4-BE49-F238E27FC236}">
-                <a16:creationId xmlns:a16="http://schemas.microsoft.com/office/drawing/2014/main" id="{1592A83F-E0C3-4CFE-ACD2-C57B215C2A97}"/>
-              </a:ext>
-            </a:extLst>
-          </p:cNvPr>
-          <p:cNvSpPr txBox="1"/>
-          <p:nvPr/>
-        </p:nvSpPr>
-        <p:spPr>
-          <a:xfrm>
-            <a:off x="833718" y="6185647"/>
-            <a:ext cx="8023735" cy="307777"/>
-          </a:xfrm>
-          <a:prstGeom prst="rect">
-            <a:avLst/>
-          </a:prstGeom>
-          <a:noFill/>
-        </p:spPr>
-        <p:txBody>
-          <a:bodyPr wrap="none" rtlCol="0">
-            <a:spAutoFit/>
-          </a:bodyPr>
-          <a:lstStyle/>
-          <a:p>
-            <a:r>
-              <a:rPr lang="en-US" sz="1400" dirty="0" err="1">
-                <a:latin typeface="+mj-lt"/>
-              </a:rPr>
-              <a:t>Bereznuik</a:t>
-            </a:r>
-            <a:r>
-              <a:rPr lang="en-US" sz="1400" dirty="0">
-                <a:latin typeface="+mj-lt"/>
-              </a:rPr>
-              <a:t> et al. “A scale-dependent notion of effective dimension” </a:t>
-            </a:r>
-            <a:r>
-              <a:rPr lang="en-US" sz="1400" dirty="0" err="1">
-                <a:latin typeface="+mj-lt"/>
-              </a:rPr>
-              <a:t>arXiv</a:t>
-            </a:r>
-            <a:r>
-              <a:rPr lang="en-US" sz="1400" dirty="0">
-                <a:latin typeface="+mj-lt"/>
-              </a:rPr>
-              <a:t> preprint </a:t>
-            </a:r>
-            <a:r>
-              <a:rPr lang="en-US" sz="1400" dirty="0" err="1">
-                <a:latin typeface="+mj-lt"/>
-              </a:rPr>
-              <a:t>arXiv</a:t>
-            </a:r>
-            <a:r>
-              <a:rPr lang="en-US" sz="1400" dirty="0">
-                <a:latin typeface="+mj-lt"/>
-              </a:rPr>
-              <a:t>: 2001.10872 (2020)</a:t>
-            </a:r>
-          </a:p>
-        </p:txBody>
-      </p:sp>
     </p:spTree>
     <p:extLst>
       <p:ext uri="{BB962C8B-B14F-4D97-AF65-F5344CB8AC3E}">
-        <p14:creationId xmlns:p14="http://schemas.microsoft.com/office/powerpoint/2010/main" val="1107001750"/>
+        <p14:creationId xmlns:p14="http://schemas.microsoft.com/office/powerpoint/2010/main" val="3457616166"/>
       </p:ext>
     </p:extLst>
   </p:cSld>
@@ -3275,7 +3345,7 @@
       </p:grpSpPr>
       <p:sp>
         <p:nvSpPr>
-          <p:cNvPr id="3" name="Title 2"/>
+          <p:cNvPr id="4" name="Title 3"/>
           <p:cNvSpPr>
             <a:spLocks noGrp="1"/>
           </p:cNvSpPr>
@@ -3293,137 +3363,17 @@
                 <a:latin typeface="Segoe UI Light" panose="020B0502040204020203" pitchFamily="34" charset="0"/>
                 <a:cs typeface="Segoe UI Light" panose="020B0502040204020203" pitchFamily="34" charset="0"/>
               </a:rPr>
-              <a:t>Effective Dimension and Generalization</a:t>
-            </a:r>
-          </a:p>
-        </p:txBody>
-      </p:sp>
-      <p:sp>
-        <p:nvSpPr>
-          <p:cNvPr id="5" name="Content Placeholder 4"/>
-          <p:cNvSpPr>
-            <a:spLocks noGrp="1"/>
-          </p:cNvSpPr>
-          <p:nvPr>
-            <p:ph sz="half" idx="4294967295"/>
-          </p:nvPr>
-        </p:nvSpPr>
-        <p:spPr>
-          <a:xfrm>
-            <a:off x="541610" y="1431010"/>
-            <a:ext cx="10027778" cy="1428731"/>
-          </a:xfrm>
-        </p:spPr>
-        <p:txBody>
-          <a:bodyPr vert="horz" lIns="91440" tIns="45720" rIns="91440" bIns="45720" rtlCol="0">
-            <a:normAutofit/>
-          </a:bodyPr>
-          <a:lstStyle/>
-          <a:p>
-            <a:pPr marL="0" indent="0">
-              <a:lnSpc>
-                <a:spcPts val="1800"/>
-              </a:lnSpc>
-              <a:spcBef>
-                <a:spcPts val="1000"/>
-              </a:spcBef>
-              <a:spcAft>
-                <a:spcPts val="600"/>
-              </a:spcAft>
-              <a:buNone/>
-            </a:pPr>
-            <a:r>
-              <a:rPr lang="en-US" sz="1400" b="1" dirty="0">
-                <a:solidFill>
-                  <a:prstClr val="black">
-                    <a:lumMod val="75000"/>
-                    <a:lumOff val="25000"/>
-                  </a:prstClr>
-                </a:solidFill>
-                <a:latin typeface="+mj-lt"/>
-                <a:cs typeface="Segoe UI" panose="020B0502040204020203" pitchFamily="34" charset="0"/>
-              </a:rPr>
-              <a:t>Generalization Error</a:t>
-            </a:r>
-          </a:p>
-          <a:p>
-            <a:pPr marL="0" indent="0">
-              <a:lnSpc>
-                <a:spcPts val="1800"/>
-              </a:lnSpc>
-              <a:spcBef>
-                <a:spcPts val="1000"/>
-              </a:spcBef>
-              <a:spcAft>
-                <a:spcPts val="600"/>
-              </a:spcAft>
-              <a:buNone/>
-            </a:pPr>
-            <a:r>
-              <a:rPr lang="en-US" b="1" dirty="0">
-                <a:latin typeface="+mj-lt"/>
-                <a:cs typeface="Segoe UI" panose="020B0502040204020203" pitchFamily="34" charset="0"/>
-              </a:rPr>
-              <a:t>We want to make statements about the performance of a model on unseen data</a:t>
-            </a:r>
-          </a:p>
-          <a:p>
-            <a:pPr marL="0" indent="0">
-              <a:lnSpc>
-                <a:spcPts val="1800"/>
-              </a:lnSpc>
-              <a:spcBef>
-                <a:spcPts val="1000"/>
-              </a:spcBef>
-              <a:spcAft>
-                <a:spcPts val="600"/>
-              </a:spcAft>
-              <a:buNone/>
-            </a:pPr>
-            <a:r>
-              <a:rPr lang="en-US" b="1" dirty="0">
-                <a:latin typeface="+mj-lt"/>
-                <a:cs typeface="Segoe UI" panose="020B0502040204020203" pitchFamily="34" charset="0"/>
-              </a:rPr>
-              <a:t>A capacity measure can help give information about the generalization  error by way of a generalization bound</a:t>
-            </a:r>
-            <a:endParaRPr lang="en-US" dirty="0">
-              <a:latin typeface="+mj-lt"/>
-              <a:cs typeface="Segoe UI" panose="020B0502040204020203" pitchFamily="34" charset="0"/>
-            </a:endParaRPr>
-          </a:p>
-          <a:p>
-            <a:pPr marL="0" indent="0">
-              <a:lnSpc>
-                <a:spcPts val="1800"/>
-              </a:lnSpc>
-              <a:spcBef>
-                <a:spcPts val="1000"/>
-              </a:spcBef>
-              <a:spcAft>
-                <a:spcPts val="600"/>
-              </a:spcAft>
-              <a:buNone/>
-            </a:pPr>
-            <a:endParaRPr lang="en-US" sz="1200" dirty="0">
-              <a:solidFill>
-                <a:prstClr val="black">
-                  <a:lumMod val="75000"/>
-                  <a:lumOff val="25000"/>
-                </a:prstClr>
-              </a:solidFill>
-              <a:latin typeface="Segoe UI" panose="020B0502040204020203" pitchFamily="34" charset="0"/>
-              <a:cs typeface="Segoe UI" panose="020B0502040204020203" pitchFamily="34" charset="0"/>
-            </a:endParaRPr>
+              <a:t>Effective Dimension</a:t>
+            </a:r>
           </a:p>
         </p:txBody>
       </p:sp>
       <p:pic>
         <p:nvPicPr>
-          <p:cNvPr id="8" name="Picture 7">
+          <p:cNvPr id="3" name="Picture 2">
             <a:extLst>
               <a:ext uri="{FF2B5EF4-FFF2-40B4-BE49-F238E27FC236}">
-                <a16:creationId xmlns:a16="http://schemas.microsoft.com/office/drawing/2014/main" id="{C4BDCC08-231D-4C30-AF51-37FD92FD764B}"/>
+                <a16:creationId xmlns:a16="http://schemas.microsoft.com/office/drawing/2014/main" id="{E0912AD9-06AC-4679-A21A-84B0BEC5C640}"/>
               </a:ext>
             </a:extLst>
           </p:cNvPr>
@@ -3440,18 +3390,130 @@
         </p:blipFill>
         <p:spPr>
           <a:xfrm>
-            <a:off x="606177" y="3060919"/>
-            <a:ext cx="6569009" cy="937341"/>
+            <a:off x="838266" y="1628723"/>
+            <a:ext cx="7221004" cy="3779848"/>
           </a:xfrm>
           <a:prstGeom prst="rect">
             <a:avLst/>
           </a:prstGeom>
         </p:spPr>
       </p:pic>
+      <p:sp>
+        <p:nvSpPr>
+          <p:cNvPr id="5" name="TextBox 4">
+            <a:extLst>
+              <a:ext uri="{FF2B5EF4-FFF2-40B4-BE49-F238E27FC236}">
+                <a16:creationId xmlns:a16="http://schemas.microsoft.com/office/drawing/2014/main" id="{F3EF3F4D-B57F-439F-9FBE-14892F1D7A0F}"/>
+              </a:ext>
+            </a:extLst>
+          </p:cNvPr>
+          <p:cNvSpPr txBox="1"/>
+          <p:nvPr/>
+        </p:nvSpPr>
+        <p:spPr>
+          <a:xfrm>
+            <a:off x="8229600" y="1628723"/>
+            <a:ext cx="3726216" cy="1200329"/>
+          </a:xfrm>
+          <a:prstGeom prst="rect">
+            <a:avLst/>
+          </a:prstGeom>
+          <a:noFill/>
+        </p:spPr>
+        <p:txBody>
+          <a:bodyPr wrap="square" rtlCol="0">
+            <a:spAutoFit/>
+          </a:bodyPr>
+          <a:lstStyle/>
+          <a:p>
+            <a:r>
+              <a:rPr lang="en-US" dirty="0">
+                <a:latin typeface="+mj-lt"/>
+              </a:rPr>
+              <a:t>Effective dimension determines the effectiveness of our models. It gives us a sense of irrelevant features, </a:t>
+            </a:r>
+          </a:p>
+          <a:p>
+            <a:r>
+              <a:rPr lang="en-US" dirty="0">
+                <a:latin typeface="+mj-lt"/>
+              </a:rPr>
+              <a:t>flat landscapes, etc.</a:t>
+            </a:r>
+          </a:p>
+        </p:txBody>
+      </p:sp>
+      <p:sp>
+        <p:nvSpPr>
+          <p:cNvPr id="26" name="TextBox 25">
+            <a:extLst>
+              <a:ext uri="{FF2B5EF4-FFF2-40B4-BE49-F238E27FC236}">
+                <a16:creationId xmlns:a16="http://schemas.microsoft.com/office/drawing/2014/main" id="{1592A83F-E0C3-4CFE-ACD2-C57B215C2A97}"/>
+              </a:ext>
+            </a:extLst>
+          </p:cNvPr>
+          <p:cNvSpPr txBox="1"/>
+          <p:nvPr/>
+        </p:nvSpPr>
+        <p:spPr>
+          <a:xfrm>
+            <a:off x="833718" y="6185647"/>
+            <a:ext cx="8023735" cy="307777"/>
+          </a:xfrm>
+          <a:prstGeom prst="rect">
+            <a:avLst/>
+          </a:prstGeom>
+          <a:noFill/>
+        </p:spPr>
+        <p:txBody>
+          <a:bodyPr wrap="none" rtlCol="0">
+            <a:spAutoFit/>
+          </a:bodyPr>
+          <a:lstStyle/>
+          <a:p>
+            <a:r>
+              <a:rPr lang="en-US" sz="1400" dirty="0" err="1">
+                <a:latin typeface="+mj-lt"/>
+              </a:rPr>
+              <a:t>Bereznuik</a:t>
+            </a:r>
+            <a:r>
+              <a:rPr lang="en-US" sz="1400" dirty="0">
+                <a:latin typeface="+mj-lt"/>
+              </a:rPr>
+              <a:t> et al. “A scale-dependent notion of effective dimension” </a:t>
+            </a:r>
+            <a:r>
+              <a:rPr lang="en-US" sz="1400" dirty="0" err="1">
+                <a:latin typeface="+mj-lt"/>
+              </a:rPr>
+              <a:t>arXiv</a:t>
+            </a:r>
+            <a:r>
+              <a:rPr lang="en-US" sz="1400" dirty="0">
+                <a:latin typeface="+mj-lt"/>
+              </a:rPr>
+              <a:t> preprint </a:t>
+            </a:r>
+            <a:r>
+              <a:rPr lang="en-US" sz="1400" dirty="0" err="1">
+                <a:latin typeface="+mj-lt"/>
+              </a:rPr>
+              <a:t>arXiv</a:t>
+            </a:r>
+            <a:r>
+              <a:rPr lang="en-US" sz="1400" dirty="0">
+                <a:latin typeface="+mj-lt"/>
+              </a:rPr>
+              <a:t>: 2001.10872 (2020)</a:t>
+            </a:r>
+          </a:p>
+        </p:txBody>
+      </p:sp>
     </p:spTree>
     <p:extLst>
       <p:ext uri="{BB962C8B-B14F-4D97-AF65-F5344CB8AC3E}">
-        <p14:creationId xmlns:p14="http://schemas.microsoft.com/office/powerpoint/2010/main" val="958036878"/>
+        <p14:creationId xmlns:p14="http://schemas.microsoft.com/office/powerpoint/2010/main" val="1107001750"/>
       </p:ext>
     </p:extLst>
   </p:cSld>
@@ -3506,6 +3568,219 @@
                 <a:latin typeface="Segoe UI Light" panose="020B0502040204020203" pitchFamily="34" charset="0"/>
                 <a:cs typeface="Segoe UI Light" panose="020B0502040204020203" pitchFamily="34" charset="0"/>
               </a:rPr>
+              <a:t>Effective Dimension and Generalization</a:t>
+            </a:r>
+          </a:p>
+        </p:txBody>
+      </p:sp>
+      <p:sp>
+        <p:nvSpPr>
+          <p:cNvPr id="5" name="Content Placeholder 4"/>
+          <p:cNvSpPr>
+            <a:spLocks noGrp="1"/>
+          </p:cNvSpPr>
+          <p:nvPr>
+            <p:ph sz="half" idx="4294967295"/>
+          </p:nvPr>
+        </p:nvSpPr>
+        <p:spPr>
+          <a:xfrm>
+            <a:off x="541610" y="1431010"/>
+            <a:ext cx="10027778" cy="1428731"/>
+          </a:xfrm>
+        </p:spPr>
+        <p:txBody>
+          <a:bodyPr vert="horz" lIns="91440" tIns="45720" rIns="91440" bIns="45720" rtlCol="0">
+            <a:normAutofit/>
+          </a:bodyPr>
+          <a:lstStyle/>
+          <a:p>
+            <a:pPr marL="0" indent="0">
+              <a:lnSpc>
+                <a:spcPts val="1800"/>
+              </a:lnSpc>
+              <a:spcBef>
+                <a:spcPts val="1000"/>
+              </a:spcBef>
+              <a:spcAft>
+                <a:spcPts val="600"/>
+              </a:spcAft>
+              <a:buNone/>
+            </a:pPr>
+            <a:r>
+              <a:rPr lang="en-US" sz="1400" b="1" dirty="0">
+                <a:solidFill>
+                  <a:prstClr val="black">
+                    <a:lumMod val="75000"/>
+                    <a:lumOff val="25000"/>
+                  </a:prstClr>
+                </a:solidFill>
+                <a:latin typeface="+mj-lt"/>
+                <a:cs typeface="Segoe UI" panose="020B0502040204020203" pitchFamily="34" charset="0"/>
+              </a:rPr>
+              <a:t>Generalization Error</a:t>
+            </a:r>
+          </a:p>
+          <a:p>
+            <a:pPr marL="0" indent="0">
+              <a:lnSpc>
+                <a:spcPts val="1800"/>
+              </a:lnSpc>
+              <a:spcBef>
+                <a:spcPts val="1000"/>
+              </a:spcBef>
+              <a:spcAft>
+                <a:spcPts val="600"/>
+              </a:spcAft>
+              <a:buNone/>
+            </a:pPr>
+            <a:r>
+              <a:rPr lang="en-US" b="1" dirty="0">
+                <a:latin typeface="+mj-lt"/>
+                <a:cs typeface="Segoe UI" panose="020B0502040204020203" pitchFamily="34" charset="0"/>
+              </a:rPr>
+              <a:t>We want to make statements about the performance of a model on unseen data</a:t>
+            </a:r>
+          </a:p>
+          <a:p>
+            <a:pPr marL="0" indent="0">
+              <a:lnSpc>
+                <a:spcPts val="1800"/>
+              </a:lnSpc>
+              <a:spcBef>
+                <a:spcPts val="1000"/>
+              </a:spcBef>
+              <a:spcAft>
+                <a:spcPts val="600"/>
+              </a:spcAft>
+              <a:buNone/>
+            </a:pPr>
+            <a:r>
+              <a:rPr lang="en-US" b="1" dirty="0">
+                <a:latin typeface="+mj-lt"/>
+                <a:cs typeface="Segoe UI" panose="020B0502040204020203" pitchFamily="34" charset="0"/>
+              </a:rPr>
+              <a:t>A capacity measure can help give information about the generalization  error by way of a generalization bound</a:t>
+            </a:r>
+            <a:endParaRPr lang="en-US" dirty="0">
+              <a:latin typeface="+mj-lt"/>
+              <a:cs typeface="Segoe UI" panose="020B0502040204020203" pitchFamily="34" charset="0"/>
+            </a:endParaRPr>
+          </a:p>
+          <a:p>
+            <a:pPr marL="0" indent="0">
+              <a:lnSpc>
+                <a:spcPts val="1800"/>
+              </a:lnSpc>
+              <a:spcBef>
+                <a:spcPts val="1000"/>
+              </a:spcBef>
+              <a:spcAft>
+                <a:spcPts val="600"/>
+              </a:spcAft>
+              <a:buNone/>
+            </a:pPr>
+            <a:endParaRPr lang="en-US" sz="1200" dirty="0">
+              <a:solidFill>
+                <a:prstClr val="black">
+                  <a:lumMod val="75000"/>
+                  <a:lumOff val="25000"/>
+                </a:prstClr>
+              </a:solidFill>
+              <a:latin typeface="Segoe UI" panose="020B0502040204020203" pitchFamily="34" charset="0"/>
+              <a:cs typeface="Segoe UI" panose="020B0502040204020203" pitchFamily="34" charset="0"/>
+            </a:endParaRPr>
+          </a:p>
+        </p:txBody>
+      </p:sp>
+      <p:pic>
+        <p:nvPicPr>
+          <p:cNvPr id="8" name="Picture 7">
+            <a:extLst>
+              <a:ext uri="{FF2B5EF4-FFF2-40B4-BE49-F238E27FC236}">
+                <a16:creationId xmlns:a16="http://schemas.microsoft.com/office/drawing/2014/main" id="{C4BDCC08-231D-4C30-AF51-37FD92FD764B}"/>
+              </a:ext>
+            </a:extLst>
+          </p:cNvPr>
+          <p:cNvPicPr>
+            <a:picLocks noChangeAspect="1"/>
+          </p:cNvPicPr>
+          <p:nvPr/>
+        </p:nvPicPr>
+        <p:blipFill>
+          <a:blip r:embed="rId2"/>
+          <a:stretch>
+            <a:fillRect/>
+          </a:stretch>
+        </p:blipFill>
+        <p:spPr>
+          <a:xfrm>
+            <a:off x="606177" y="3060919"/>
+            <a:ext cx="6569009" cy="937341"/>
+          </a:xfrm>
+          <a:prstGeom prst="rect">
+            <a:avLst/>
+          </a:prstGeom>
+        </p:spPr>
+      </p:pic>
+    </p:spTree>
+    <p:extLst>
+      <p:ext uri="{BB962C8B-B14F-4D97-AF65-F5344CB8AC3E}">
+        <p14:creationId xmlns:p14="http://schemas.microsoft.com/office/powerpoint/2010/main" val="958036878"/>
+      </p:ext>
+    </p:extLst>
+  </p:cSld>
+  <p:clrMapOvr>
+    <a:masterClrMapping/>
+  </p:clrMapOvr>
+  <mc:AlternateContent xmlns:mc="http://schemas.openxmlformats.org/markup-compatibility/2006" xmlns:p14="http://schemas.microsoft.com/office/powerpoint/2010/main">
+    <mc:Choice Requires="p14">
+      <p:transition p14:dur="10"/>
+    </mc:Choice>
+    <mc:Fallback xmlns="">
+      <p:transition/>
+    </mc:Fallback>
+  </mc:AlternateContent>
+</p:sld>
+</file>
+
+<file path=ppt/slides/slide6.xml><?xml version="1.0" encoding="utf-8"?>
+<p:sld xmlns:a="http://schemas.openxmlformats.org/drawingml/2006/main" xmlns:r="http://schemas.openxmlformats.org/officeDocument/2006/relationships" xmlns:p="http://schemas.openxmlformats.org/presentationml/2006/main">
+  <p:cSld>
+    <p:spTree>
+      <p:nvGrpSpPr>
+        <p:cNvPr id="1" name=""/>
+        <p:cNvGrpSpPr/>
+        <p:nvPr/>
+      </p:nvGrpSpPr>
+      <p:grpSpPr>
+        <a:xfrm>
+          <a:off x="0" y="0"/>
+          <a:ext cx="0" cy="0"/>
+          <a:chOff x="0" y="0"/>
+          <a:chExt cx="0" cy="0"/>
+        </a:xfrm>
+      </p:grpSpPr>
+      <p:sp>
+        <p:nvSpPr>
+          <p:cNvPr id="3" name="Title 2"/>
+          <p:cNvSpPr>
+            <a:spLocks noGrp="1"/>
+          </p:cNvSpPr>
+          <p:nvPr>
+            <p:ph type="title"/>
+          </p:nvPr>
+        </p:nvSpPr>
+        <p:spPr/>
+        <p:txBody>
+          <a:bodyPr/>
+          <a:lstStyle/>
+          <a:p>
+            <a:r>
+              <a:rPr lang="en-US" dirty="0">
+                <a:latin typeface="Segoe UI Light" panose="020B0502040204020203" pitchFamily="34" charset="0"/>
+                <a:cs typeface="Segoe UI Light" panose="020B0502040204020203" pitchFamily="34" charset="0"/>
+              </a:rPr>
               <a:t>Generalization of Effective Dimension</a:t>
             </a:r>
           </a:p>
@@ -3810,234 +4085,6 @@
     <p:extLst>
       <p:ext uri="{BB962C8B-B14F-4D97-AF65-F5344CB8AC3E}">
         <p14:creationId xmlns:p14="http://schemas.microsoft.com/office/powerpoint/2010/main" val="2596833607"/>
-      </p:ext>
-    </p:extLst>
-  </p:cSld>
-  <p:clrMapOvr>
-    <a:masterClrMapping/>
-  </p:clrMapOvr>
-</p:sld>
-</file>
-
-<file path=ppt/slides/slide6.xml><?xml version="1.0" encoding="utf-8"?>
-<p:sld xmlns:a="http://schemas.openxmlformats.org/drawingml/2006/main" xmlns:r="http://schemas.openxmlformats.org/officeDocument/2006/relationships" xmlns:p="http://schemas.openxmlformats.org/presentationml/2006/main">
-  <p:cSld>
-    <p:spTree>
-      <p:nvGrpSpPr>
-        <p:cNvPr id="1" name=""/>
-        <p:cNvGrpSpPr/>
-        <p:nvPr/>
-      </p:nvGrpSpPr>
-      <p:grpSpPr>
-        <a:xfrm>
-          <a:off x="0" y="0"/>
-          <a:ext cx="0" cy="0"/>
-          <a:chOff x="0" y="0"/>
-          <a:chExt cx="0" cy="0"/>
-        </a:xfrm>
-      </p:grpSpPr>
-      <p:sp>
-        <p:nvSpPr>
-          <p:cNvPr id="2" name="Title 1">
-            <a:extLst>
-              <a:ext uri="{FF2B5EF4-FFF2-40B4-BE49-F238E27FC236}">
-                <a16:creationId xmlns:a16="http://schemas.microsoft.com/office/drawing/2014/main" id="{BF2F1DEE-C6C2-46E6-9BE6-C8D21FA2FB28}"/>
-              </a:ext>
-            </a:extLst>
-          </p:cNvPr>
-          <p:cNvSpPr>
-            <a:spLocks noGrp="1"/>
-          </p:cNvSpPr>
-          <p:nvPr>
-            <p:ph type="title"/>
-          </p:nvPr>
-        </p:nvSpPr>
-        <p:spPr/>
-        <p:txBody>
-          <a:bodyPr/>
-          <a:lstStyle/>
-          <a:p>
-            <a:r>
-              <a:rPr lang="en-US" dirty="0"/>
-              <a:t>Fisher Information Matrix Spectrum</a:t>
-            </a:r>
-          </a:p>
-        </p:txBody>
-      </p:sp>
-      <p:pic>
-        <p:nvPicPr>
-          <p:cNvPr id="5" name="Content Placeholder 4">
-            <a:extLst>
-              <a:ext uri="{FF2B5EF4-FFF2-40B4-BE49-F238E27FC236}">
-                <a16:creationId xmlns:a16="http://schemas.microsoft.com/office/drawing/2014/main" id="{F8E9EFA6-FF8F-4DF9-A923-D9E132205365}"/>
-              </a:ext>
-            </a:extLst>
-          </p:cNvPr>
-          <p:cNvPicPr>
-            <a:picLocks noGrp="1" noChangeAspect="1"/>
-          </p:cNvPicPr>
-          <p:nvPr>
-            <p:ph sz="quarter" idx="10"/>
-          </p:nvPr>
-        </p:nvPicPr>
-        <p:blipFill>
-          <a:blip r:embed="rId2"/>
-          <a:stretch>
-            <a:fillRect/>
-          </a:stretch>
-        </p:blipFill>
-        <p:spPr>
-          <a:xfrm>
-            <a:off x="826621" y="4106069"/>
-            <a:ext cx="4416425" cy="1573074"/>
-          </a:xfrm>
-        </p:spPr>
-      </p:pic>
-      <p:pic>
-        <p:nvPicPr>
-          <p:cNvPr id="7" name="Picture 6">
-            <a:extLst>
-              <a:ext uri="{FF2B5EF4-FFF2-40B4-BE49-F238E27FC236}">
-                <a16:creationId xmlns:a16="http://schemas.microsoft.com/office/drawing/2014/main" id="{655AEDCE-4103-42AE-8C54-965B307EF838}"/>
-              </a:ext>
-            </a:extLst>
-          </p:cNvPr>
-          <p:cNvPicPr>
-            <a:picLocks noChangeAspect="1"/>
-          </p:cNvPicPr>
-          <p:nvPr/>
-        </p:nvPicPr>
-        <p:blipFill rotWithShape="1">
-          <a:blip r:embed="rId3"/>
-          <a:srcRect t="11535"/>
-          <a:stretch/>
-        </p:blipFill>
-        <p:spPr>
-          <a:xfrm>
-            <a:off x="5638800" y="1515035"/>
-            <a:ext cx="5899239" cy="4063557"/>
-          </a:xfrm>
-          <a:prstGeom prst="rect">
-            <a:avLst/>
-          </a:prstGeom>
-        </p:spPr>
-      </p:pic>
-      <p:sp>
-        <p:nvSpPr>
-          <p:cNvPr id="8" name="TextBox 7">
-            <a:extLst>
-              <a:ext uri="{FF2B5EF4-FFF2-40B4-BE49-F238E27FC236}">
-                <a16:creationId xmlns:a16="http://schemas.microsoft.com/office/drawing/2014/main" id="{92725B10-5FA1-4AF5-9357-45D6640C1BB0}"/>
-              </a:ext>
-            </a:extLst>
-          </p:cNvPr>
-          <p:cNvSpPr txBox="1"/>
-          <p:nvPr/>
-        </p:nvSpPr>
-        <p:spPr>
-          <a:xfrm>
-            <a:off x="826621" y="1674674"/>
-            <a:ext cx="3790763" cy="1754326"/>
-          </a:xfrm>
-          <a:prstGeom prst="rect">
-            <a:avLst/>
-          </a:prstGeom>
-          <a:noFill/>
-        </p:spPr>
-        <p:txBody>
-          <a:bodyPr wrap="square" rtlCol="0">
-            <a:spAutoFit/>
-          </a:bodyPr>
-          <a:lstStyle/>
-          <a:p>
-            <a:pPr algn="just"/>
-            <a:r>
-              <a:rPr lang="en-US" dirty="0">
-                <a:latin typeface="+mj-lt"/>
-              </a:rPr>
-              <a:t>The Fisher information is a way of measuring the amount of information that an observable random variable X carries about an unknown parameter theta  upon which the probability of X depends. (Source: Wikipedia)</a:t>
-            </a:r>
-          </a:p>
-        </p:txBody>
-      </p:sp>
-      <p:sp>
-        <p:nvSpPr>
-          <p:cNvPr id="9" name="TextBox 8">
-            <a:extLst>
-              <a:ext uri="{FF2B5EF4-FFF2-40B4-BE49-F238E27FC236}">
-                <a16:creationId xmlns:a16="http://schemas.microsoft.com/office/drawing/2014/main" id="{157401E1-F3EE-4844-A5D7-49310A94D358}"/>
-              </a:ext>
-            </a:extLst>
-          </p:cNvPr>
-          <p:cNvSpPr txBox="1"/>
-          <p:nvPr/>
-        </p:nvSpPr>
-        <p:spPr>
-          <a:xfrm>
-            <a:off x="1712259" y="5871882"/>
-            <a:ext cx="2988319" cy="369332"/>
-          </a:xfrm>
-          <a:prstGeom prst="rect">
-            <a:avLst/>
-          </a:prstGeom>
-          <a:noFill/>
-        </p:spPr>
-        <p:txBody>
-          <a:bodyPr wrap="none" rtlCol="0">
-            <a:spAutoFit/>
-          </a:bodyPr>
-          <a:lstStyle/>
-          <a:p>
-            <a:r>
-              <a:rPr lang="en-US" dirty="0">
-                <a:latin typeface="+mj-lt"/>
-              </a:rPr>
-              <a:t>Fig 3: Trainable Landscape [1]</a:t>
-            </a:r>
-          </a:p>
-        </p:txBody>
-      </p:sp>
-      <p:sp>
-        <p:nvSpPr>
-          <p:cNvPr id="11" name="TextBox 10">
-            <a:extLst>
-              <a:ext uri="{FF2B5EF4-FFF2-40B4-BE49-F238E27FC236}">
-                <a16:creationId xmlns:a16="http://schemas.microsoft.com/office/drawing/2014/main" id="{5E18A7FE-9B7E-4017-8F75-58BCBCAA636B}"/>
-              </a:ext>
-            </a:extLst>
-          </p:cNvPr>
-          <p:cNvSpPr txBox="1"/>
-          <p:nvPr/>
-        </p:nvSpPr>
-        <p:spPr>
-          <a:xfrm>
-            <a:off x="6634346" y="5820825"/>
-            <a:ext cx="4338454" cy="369332"/>
-          </a:xfrm>
-          <a:prstGeom prst="rect">
-            <a:avLst/>
-          </a:prstGeom>
-          <a:noFill/>
-        </p:spPr>
-        <p:txBody>
-          <a:bodyPr wrap="square">
-            <a:spAutoFit/>
-          </a:bodyPr>
-          <a:lstStyle/>
-          <a:p>
-            <a:r>
-              <a:rPr lang="en-US" dirty="0">
-                <a:latin typeface="+mj-lt"/>
-              </a:rPr>
-              <a:t>Fig 4: Fisher Information Matrix Histogram</a:t>
-            </a:r>
-          </a:p>
-        </p:txBody>
-      </p:sp>
-    </p:spTree>
-    <p:extLst>
-      <p:ext uri="{BB962C8B-B14F-4D97-AF65-F5344CB8AC3E}">
-        <p14:creationId xmlns:p14="http://schemas.microsoft.com/office/powerpoint/2010/main" val="3805535186"/>
       </p:ext>
     </p:extLst>
   </p:cSld>
@@ -4069,7 +4116,7 @@
           <p:cNvPr id="2" name="Title 1">
             <a:extLst>
               <a:ext uri="{FF2B5EF4-FFF2-40B4-BE49-F238E27FC236}">
-                <a16:creationId xmlns:a16="http://schemas.microsoft.com/office/drawing/2014/main" id="{6D4CF992-0EAC-492D-947C-001DBFC8DBCE}"/>
+                <a16:creationId xmlns:a16="http://schemas.microsoft.com/office/drawing/2014/main" id="{BF2F1DEE-C6C2-46E6-9BE6-C8D21FA2FB28}"/>
               </a:ext>
             </a:extLst>
           </p:cNvPr>
@@ -4087,57 +4134,46 @@
           <a:p>
             <a:r>
               <a:rPr lang="en-US" dirty="0"/>
-              <a:t>Example CNN and QNN</a:t>
-            </a:r>
-          </a:p>
-        </p:txBody>
-      </p:sp>
-      <p:sp>
-        <p:nvSpPr>
-          <p:cNvPr id="7" name="Content Placeholder 6">
+              <a:t>Fisher Information Matrix Spectrum</a:t>
+            </a:r>
+          </a:p>
+        </p:txBody>
+      </p:sp>
+      <p:pic>
+        <p:nvPicPr>
+          <p:cNvPr id="5" name="Content Placeholder 4">
             <a:extLst>
               <a:ext uri="{FF2B5EF4-FFF2-40B4-BE49-F238E27FC236}">
-                <a16:creationId xmlns:a16="http://schemas.microsoft.com/office/drawing/2014/main" id="{209DEC08-ED21-4828-986A-2FF603B8D7D2}"/>
+                <a16:creationId xmlns:a16="http://schemas.microsoft.com/office/drawing/2014/main" id="{F8E9EFA6-FF8F-4DF9-A923-D9E132205365}"/>
               </a:ext>
             </a:extLst>
           </p:cNvPr>
-          <p:cNvSpPr>
-            <a:spLocks noGrp="1"/>
-          </p:cNvSpPr>
+          <p:cNvPicPr>
+            <a:picLocks noGrp="1" noChangeAspect="1"/>
+          </p:cNvPicPr>
           <p:nvPr>
             <p:ph sz="quarter" idx="10"/>
           </p:nvPr>
-        </p:nvSpPr>
-        <p:spPr>
-          <a:xfrm>
-            <a:off x="629143" y="1501853"/>
-            <a:ext cx="5099304" cy="640080"/>
-          </a:xfrm>
-        </p:spPr>
-        <p:txBody>
-          <a:bodyPr>
-            <a:normAutofit/>
-          </a:bodyPr>
-          <a:lstStyle/>
-          <a:p>
-            <a:r>
-              <a:rPr lang="en-US" sz="1600" b="1" i="1" dirty="0">
-                <a:solidFill>
-                  <a:srgbClr val="FF0000"/>
-                </a:solidFill>
-                <a:latin typeface="+mj-lt"/>
-              </a:rPr>
-              <a:t>Modelling CNN</a:t>
-            </a:r>
-          </a:p>
-        </p:txBody>
-      </p:sp>
+        </p:nvPicPr>
+        <p:blipFill>
+          <a:blip r:embed="rId2"/>
+          <a:stretch>
+            <a:fillRect/>
+          </a:stretch>
+        </p:blipFill>
+        <p:spPr>
+          <a:xfrm>
+            <a:off x="826621" y="4106069"/>
+            <a:ext cx="4416425" cy="1573074"/>
+          </a:xfrm>
+        </p:spPr>
+      </p:pic>
       <p:pic>
         <p:nvPicPr>
-          <p:cNvPr id="9" name="Picture 8">
+          <p:cNvPr id="7" name="Picture 6">
             <a:extLst>
               <a:ext uri="{FF2B5EF4-FFF2-40B4-BE49-F238E27FC236}">
-                <a16:creationId xmlns:a16="http://schemas.microsoft.com/office/drawing/2014/main" id="{9C770625-C639-4A71-B1D1-B1DB0C573972}"/>
+                <a16:creationId xmlns:a16="http://schemas.microsoft.com/office/drawing/2014/main" id="{655AEDCE-4103-42AE-8C54-965B307EF838}"/>
               </a:ext>
             </a:extLst>
           </p:cNvPr>
@@ -4146,16 +4182,15 @@
           </p:cNvPicPr>
           <p:nvPr/>
         </p:nvPicPr>
-        <p:blipFill>
-          <a:blip r:embed="rId2"/>
-          <a:stretch>
-            <a:fillRect/>
-          </a:stretch>
+        <p:blipFill rotWithShape="1">
+          <a:blip r:embed="rId3"/>
+          <a:srcRect t="11535"/>
+          <a:stretch/>
         </p:blipFill>
         <p:spPr>
           <a:xfrm>
-            <a:off x="629143" y="2201194"/>
-            <a:ext cx="5404103" cy="3154953"/>
+            <a:off x="5638800" y="1515035"/>
+            <a:ext cx="5899239" cy="4063557"/>
           </a:xfrm>
           <a:prstGeom prst="rect">
             <a:avLst/>
@@ -4164,10 +4199,10 @@
       </p:pic>
       <p:sp>
         <p:nvSpPr>
-          <p:cNvPr id="10" name="TextBox 9">
+          <p:cNvPr id="8" name="TextBox 7">
             <a:extLst>
               <a:ext uri="{FF2B5EF4-FFF2-40B4-BE49-F238E27FC236}">
-                <a16:creationId xmlns:a16="http://schemas.microsoft.com/office/drawing/2014/main" id="{9EE0B9F6-96C4-44E2-BC58-55AFA259FCCD}"/>
+                <a16:creationId xmlns:a16="http://schemas.microsoft.com/office/drawing/2014/main" id="{92725B10-5FA1-4AF5-9357-45D6640C1BB0}"/>
               </a:ext>
             </a:extLst>
           </p:cNvPr>
@@ -4176,8 +4211,8 @@
         </p:nvSpPr>
         <p:spPr>
           <a:xfrm>
-            <a:off x="8130988" y="1637227"/>
-            <a:ext cx="1516762" cy="338554"/>
+            <a:off x="826621" y="1674674"/>
+            <a:ext cx="3790763" cy="1754326"/>
           </a:xfrm>
           <a:prstGeom prst="rect">
             <a:avLst/>
@@ -4185,57 +4220,99 @@
           <a:noFill/>
         </p:spPr>
         <p:txBody>
+          <a:bodyPr wrap="square" rtlCol="0">
+            <a:spAutoFit/>
+          </a:bodyPr>
+          <a:lstStyle/>
+          <a:p>
+            <a:pPr algn="just"/>
+            <a:r>
+              <a:rPr lang="en-US" dirty="0">
+                <a:latin typeface="+mj-lt"/>
+              </a:rPr>
+              <a:t>The Fisher information is a way of measuring the amount of information that an observable random variable X carries about an unknown parameter theta  upon which the probability of X depends. (Source: Wikipedia)</a:t>
+            </a:r>
+          </a:p>
+        </p:txBody>
+      </p:sp>
+      <p:sp>
+        <p:nvSpPr>
+          <p:cNvPr id="9" name="TextBox 8">
+            <a:extLst>
+              <a:ext uri="{FF2B5EF4-FFF2-40B4-BE49-F238E27FC236}">
+                <a16:creationId xmlns:a16="http://schemas.microsoft.com/office/drawing/2014/main" id="{157401E1-F3EE-4844-A5D7-49310A94D358}"/>
+              </a:ext>
+            </a:extLst>
+          </p:cNvPr>
+          <p:cNvSpPr txBox="1"/>
+          <p:nvPr/>
+        </p:nvSpPr>
+        <p:spPr>
+          <a:xfrm>
+            <a:off x="1712259" y="5871882"/>
+            <a:ext cx="2988319" cy="369332"/>
+          </a:xfrm>
+          <a:prstGeom prst="rect">
+            <a:avLst/>
+          </a:prstGeom>
+          <a:noFill/>
+        </p:spPr>
+        <p:txBody>
           <a:bodyPr wrap="none" rtlCol="0">
             <a:spAutoFit/>
           </a:bodyPr>
           <a:lstStyle/>
           <a:p>
             <a:r>
-              <a:rPr lang="en-US" sz="1600" b="1" i="1" dirty="0">
-                <a:solidFill>
-                  <a:srgbClr val="FF0000"/>
-                </a:solidFill>
+              <a:rPr lang="en-US" dirty="0">
                 <a:latin typeface="+mj-lt"/>
               </a:rPr>
-              <a:t>Modelling QNN</a:t>
-            </a:r>
-          </a:p>
-        </p:txBody>
-      </p:sp>
-      <p:pic>
-        <p:nvPicPr>
-          <p:cNvPr id="12" name="Picture 11">
+              <a:t>Fig 3: Trainable Landscape [1]</a:t>
+            </a:r>
+          </a:p>
+        </p:txBody>
+      </p:sp>
+      <p:sp>
+        <p:nvSpPr>
+          <p:cNvPr id="11" name="TextBox 10">
             <a:extLst>
               <a:ext uri="{FF2B5EF4-FFF2-40B4-BE49-F238E27FC236}">
-                <a16:creationId xmlns:a16="http://schemas.microsoft.com/office/drawing/2014/main" id="{A016020F-12DF-45AE-9208-D5EA8057D138}"/>
+                <a16:creationId xmlns:a16="http://schemas.microsoft.com/office/drawing/2014/main" id="{5E18A7FE-9B7E-4017-8F75-58BCBCAA636B}"/>
               </a:ext>
             </a:extLst>
           </p:cNvPr>
-          <p:cNvPicPr>
-            <a:picLocks noChangeAspect="1"/>
-          </p:cNvPicPr>
+          <p:cNvSpPr txBox="1"/>
           <p:nvPr/>
-        </p:nvPicPr>
-        <p:blipFill>
-          <a:blip r:embed="rId3"/>
-          <a:stretch>
-            <a:fillRect/>
-          </a:stretch>
-        </p:blipFill>
-        <p:spPr>
-          <a:xfrm>
-            <a:off x="6364941" y="2201194"/>
-            <a:ext cx="5197915" cy="3921700"/>
+        </p:nvSpPr>
+        <p:spPr>
+          <a:xfrm>
+            <a:off x="6634346" y="5820825"/>
+            <a:ext cx="4338454" cy="369332"/>
           </a:xfrm>
           <a:prstGeom prst="rect">
             <a:avLst/>
           </a:prstGeom>
-        </p:spPr>
-      </p:pic>
+          <a:noFill/>
+        </p:spPr>
+        <p:txBody>
+          <a:bodyPr wrap="square">
+            <a:spAutoFit/>
+          </a:bodyPr>
+          <a:lstStyle/>
+          <a:p>
+            <a:r>
+              <a:rPr lang="en-US" dirty="0">
+                <a:latin typeface="+mj-lt"/>
+              </a:rPr>
+              <a:t>Fig 4: Fisher Information Matrix Histogram</a:t>
+            </a:r>
+          </a:p>
+        </p:txBody>
+      </p:sp>
     </p:spTree>
     <p:extLst>
       <p:ext uri="{BB962C8B-B14F-4D97-AF65-F5344CB8AC3E}">
-        <p14:creationId xmlns:p14="http://schemas.microsoft.com/office/powerpoint/2010/main" val="980256220"/>
+        <p14:creationId xmlns:p14="http://schemas.microsoft.com/office/powerpoint/2010/main" val="3805535186"/>
       </p:ext>
     </p:extLst>
   </p:cSld>
@@ -4267,7 +4344,7 @@
           <p:cNvPr id="2" name="Title 1">
             <a:extLst>
               <a:ext uri="{FF2B5EF4-FFF2-40B4-BE49-F238E27FC236}">
-                <a16:creationId xmlns:a16="http://schemas.microsoft.com/office/drawing/2014/main" id="{CC843532-6F02-4937-8A66-F42BFBA0396D}"/>
+                <a16:creationId xmlns:a16="http://schemas.microsoft.com/office/drawing/2014/main" id="{6D4CF992-0EAC-492D-947C-001DBFC8DBCE}"/>
               </a:ext>
             </a:extLst>
           </p:cNvPr>
@@ -4285,26 +4362,64 @@
           <a:p>
             <a:r>
               <a:rPr lang="en-US" dirty="0"/>
-              <a:t>Effective Dimension Plot</a:t>
+              <a:t>Example CNN and QNN</a:t>
+            </a:r>
+          </a:p>
+        </p:txBody>
+      </p:sp>
+      <p:sp>
+        <p:nvSpPr>
+          <p:cNvPr id="7" name="Content Placeholder 6">
+            <a:extLst>
+              <a:ext uri="{FF2B5EF4-FFF2-40B4-BE49-F238E27FC236}">
+                <a16:creationId xmlns:a16="http://schemas.microsoft.com/office/drawing/2014/main" id="{209DEC08-ED21-4828-986A-2FF603B8D7D2}"/>
+              </a:ext>
+            </a:extLst>
+          </p:cNvPr>
+          <p:cNvSpPr>
+            <a:spLocks noGrp="1"/>
+          </p:cNvSpPr>
+          <p:nvPr>
+            <p:ph sz="quarter" idx="10"/>
+          </p:nvPr>
+        </p:nvSpPr>
+        <p:spPr>
+          <a:xfrm>
+            <a:off x="629143" y="1501853"/>
+            <a:ext cx="5099304" cy="640080"/>
+          </a:xfrm>
+        </p:spPr>
+        <p:txBody>
+          <a:bodyPr>
+            <a:normAutofit/>
+          </a:bodyPr>
+          <a:lstStyle/>
+          <a:p>
+            <a:r>
+              <a:rPr lang="en-US" sz="1600" b="1" i="1" dirty="0">
+                <a:solidFill>
+                  <a:srgbClr val="FF0000"/>
+                </a:solidFill>
+                <a:latin typeface="+mj-lt"/>
+              </a:rPr>
+              <a:t>Modelling CNN</a:t>
             </a:r>
           </a:p>
         </p:txBody>
       </p:sp>
       <p:pic>
         <p:nvPicPr>
-          <p:cNvPr id="5" name="Content Placeholder 4" descr="Chart&#10;&#10;Description automatically generated">
+          <p:cNvPr id="9" name="Picture 8">
             <a:extLst>
               <a:ext uri="{FF2B5EF4-FFF2-40B4-BE49-F238E27FC236}">
-                <a16:creationId xmlns:a16="http://schemas.microsoft.com/office/drawing/2014/main" id="{0B3E0619-C154-4CD1-B9E3-22E577027407}"/>
+                <a16:creationId xmlns:a16="http://schemas.microsoft.com/office/drawing/2014/main" id="{9C770625-C639-4A71-B1D1-B1DB0C573972}"/>
               </a:ext>
             </a:extLst>
           </p:cNvPr>
           <p:cNvPicPr>
-            <a:picLocks noGrp="1" noChangeAspect="1"/>
+            <a:picLocks noChangeAspect="1"/>
           </p:cNvPicPr>
-          <p:nvPr>
-            <p:ph sz="quarter" idx="10"/>
-          </p:nvPr>
+          <p:nvPr/>
         </p:nvPicPr>
         <p:blipFill>
           <a:blip r:embed="rId2"/>
@@ -4314,15 +4429,88 @@
         </p:blipFill>
         <p:spPr>
           <a:xfrm>
-            <a:off x="1534219" y="1509810"/>
-            <a:ext cx="9384793" cy="4900134"/>
-          </a:xfrm>
+            <a:off x="629143" y="2201194"/>
+            <a:ext cx="5404103" cy="3154953"/>
+          </a:xfrm>
+          <a:prstGeom prst="rect">
+            <a:avLst/>
+          </a:prstGeom>
+        </p:spPr>
+      </p:pic>
+      <p:sp>
+        <p:nvSpPr>
+          <p:cNvPr id="10" name="TextBox 9">
+            <a:extLst>
+              <a:ext uri="{FF2B5EF4-FFF2-40B4-BE49-F238E27FC236}">
+                <a16:creationId xmlns:a16="http://schemas.microsoft.com/office/drawing/2014/main" id="{9EE0B9F6-96C4-44E2-BC58-55AFA259FCCD}"/>
+              </a:ext>
+            </a:extLst>
+          </p:cNvPr>
+          <p:cNvSpPr txBox="1"/>
+          <p:nvPr/>
+        </p:nvSpPr>
+        <p:spPr>
+          <a:xfrm>
+            <a:off x="8130988" y="1637227"/>
+            <a:ext cx="1516762" cy="338554"/>
+          </a:xfrm>
+          <a:prstGeom prst="rect">
+            <a:avLst/>
+          </a:prstGeom>
+          <a:noFill/>
+        </p:spPr>
+        <p:txBody>
+          <a:bodyPr wrap="none" rtlCol="0">
+            <a:spAutoFit/>
+          </a:bodyPr>
+          <a:lstStyle/>
+          <a:p>
+            <a:r>
+              <a:rPr lang="en-US" sz="1600" b="1" i="1" dirty="0">
+                <a:solidFill>
+                  <a:srgbClr val="FF0000"/>
+                </a:solidFill>
+                <a:latin typeface="+mj-lt"/>
+              </a:rPr>
+              <a:t>Modelling QNN</a:t>
+            </a:r>
+          </a:p>
+        </p:txBody>
+      </p:sp>
+      <p:pic>
+        <p:nvPicPr>
+          <p:cNvPr id="12" name="Picture 11">
+            <a:extLst>
+              <a:ext uri="{FF2B5EF4-FFF2-40B4-BE49-F238E27FC236}">
+                <a16:creationId xmlns:a16="http://schemas.microsoft.com/office/drawing/2014/main" id="{A016020F-12DF-45AE-9208-D5EA8057D138}"/>
+              </a:ext>
+            </a:extLst>
+          </p:cNvPr>
+          <p:cNvPicPr>
+            <a:picLocks noChangeAspect="1"/>
+          </p:cNvPicPr>
+          <p:nvPr/>
+        </p:nvPicPr>
+        <p:blipFill>
+          <a:blip r:embed="rId3"/>
+          <a:stretch>
+            <a:fillRect/>
+          </a:stretch>
+        </p:blipFill>
+        <p:spPr>
+          <a:xfrm>
+            <a:off x="6364941" y="2201194"/>
+            <a:ext cx="5197915" cy="3921700"/>
+          </a:xfrm>
+          <a:prstGeom prst="rect">
+            <a:avLst/>
+          </a:prstGeom>
         </p:spPr>
       </p:pic>
     </p:spTree>
     <p:extLst>
       <p:ext uri="{BB962C8B-B14F-4D97-AF65-F5344CB8AC3E}">
-        <p14:creationId xmlns:p14="http://schemas.microsoft.com/office/powerpoint/2010/main" val="3617982182"/>
+        <p14:creationId xmlns:p14="http://schemas.microsoft.com/office/powerpoint/2010/main" val="980256220"/>
       </p:ext>
     </p:extLst>
   </p:cSld>
@@ -4354,7 +4542,7 @@
           <p:cNvPr id="2" name="Title 1">
             <a:extLst>
               <a:ext uri="{FF2B5EF4-FFF2-40B4-BE49-F238E27FC236}">
-                <a16:creationId xmlns:a16="http://schemas.microsoft.com/office/drawing/2014/main" id="{AF6E429A-232A-416E-992E-3077B9AD3D83}"/>
+                <a16:creationId xmlns:a16="http://schemas.microsoft.com/office/drawing/2014/main" id="{CC843532-6F02-4937-8A66-F42BFBA0396D}"/>
               </a:ext>
             </a:extLst>
           </p:cNvPr>
@@ -4367,14 +4555,12 @@
         </p:nvSpPr>
         <p:spPr/>
         <p:txBody>
-          <a:bodyPr>
-            <a:normAutofit/>
-          </a:bodyPr>
+          <a:bodyPr/>
           <a:lstStyle/>
           <a:p>
             <a:r>
               <a:rPr lang="en-US" dirty="0"/>
-              <a:t>Eigen Value Histogram Plot</a:t>
+              <a:t>Effective Dimension Plot</a:t>
             </a:r>
           </a:p>
         </p:txBody>
@@ -4384,7 +4570,7 @@
           <p:cNvPr id="5" name="Content Placeholder 4" descr="Chart&#10;&#10;Description automatically generated">
             <a:extLst>
               <a:ext uri="{FF2B5EF4-FFF2-40B4-BE49-F238E27FC236}">
-                <a16:creationId xmlns:a16="http://schemas.microsoft.com/office/drawing/2014/main" id="{A8F52F60-3B62-4CD2-A718-E046212EECED}"/>
+                <a16:creationId xmlns:a16="http://schemas.microsoft.com/office/drawing/2014/main" id="{0B3E0619-C154-4CD1-B9E3-22E577027407}"/>
               </a:ext>
             </a:extLst>
           </p:cNvPr>
@@ -4403,15 +4589,15 @@
         </p:blipFill>
         <p:spPr>
           <a:xfrm>
-            <a:off x="700181" y="1223303"/>
-            <a:ext cx="10791638" cy="5634697"/>
+            <a:off x="1534219" y="1509810"/>
+            <a:ext cx="9384793" cy="4900134"/>
           </a:xfrm>
         </p:spPr>
       </p:pic>
     </p:spTree>
     <p:extLst>
       <p:ext uri="{BB962C8B-B14F-4D97-AF65-F5344CB8AC3E}">
-        <p14:creationId xmlns:p14="http://schemas.microsoft.com/office/powerpoint/2010/main" val="3902949574"/>
+        <p14:creationId xmlns:p14="http://schemas.microsoft.com/office/powerpoint/2010/main" val="3617982182"/>
       </p:ext>
     </p:extLst>
   </p:cSld>

</xml_diff>